<commit_message>
Further updates on architecture and graphs
</commit_message>
<xml_diff>
--- a/opends4all-resources/opends4all-foundation/GRAPH-THEORY-basic.pptx
+++ b/opends4all-resources/opends4all-foundation/GRAPH-THEORY-basic.pptx
@@ -5,10 +5,10 @@
     <p:sldMasterId id="2147483660" r:id="rId1"/>
   </p:sldMasterIdLst>
   <p:notesMasterIdLst>
-    <p:notesMasterId r:id="rId27"/>
+    <p:notesMasterId r:id="rId28"/>
   </p:notesMasterIdLst>
   <p:handoutMasterIdLst>
-    <p:handoutMasterId r:id="rId28"/>
+    <p:handoutMasterId r:id="rId29"/>
   </p:handoutMasterIdLst>
   <p:sldIdLst>
     <p:sldId id="901" r:id="rId2"/>
@@ -19,23 +19,24 @@
     <p:sldId id="1199" r:id="rId7"/>
     <p:sldId id="1200" r:id="rId8"/>
     <p:sldId id="906" r:id="rId9"/>
-    <p:sldId id="1028" r:id="rId10"/>
-    <p:sldId id="1180" r:id="rId11"/>
-    <p:sldId id="1181" r:id="rId12"/>
-    <p:sldId id="1183" r:id="rId13"/>
-    <p:sldId id="909" r:id="rId14"/>
-    <p:sldId id="913" r:id="rId15"/>
-    <p:sldId id="914" r:id="rId16"/>
-    <p:sldId id="915" r:id="rId17"/>
-    <p:sldId id="1029" r:id="rId18"/>
-    <p:sldId id="1187" r:id="rId19"/>
-    <p:sldId id="1007" r:id="rId20"/>
-    <p:sldId id="1008" r:id="rId21"/>
-    <p:sldId id="1191" r:id="rId22"/>
-    <p:sldId id="1208" r:id="rId23"/>
-    <p:sldId id="1013" r:id="rId24"/>
-    <p:sldId id="934" r:id="rId25"/>
-    <p:sldId id="1186" r:id="rId26"/>
+    <p:sldId id="1209" r:id="rId10"/>
+    <p:sldId id="1028" r:id="rId11"/>
+    <p:sldId id="1180" r:id="rId12"/>
+    <p:sldId id="1181" r:id="rId13"/>
+    <p:sldId id="1183" r:id="rId14"/>
+    <p:sldId id="909" r:id="rId15"/>
+    <p:sldId id="913" r:id="rId16"/>
+    <p:sldId id="914" r:id="rId17"/>
+    <p:sldId id="915" r:id="rId18"/>
+    <p:sldId id="1029" r:id="rId19"/>
+    <p:sldId id="1187" r:id="rId20"/>
+    <p:sldId id="1007" r:id="rId21"/>
+    <p:sldId id="1008" r:id="rId22"/>
+    <p:sldId id="1191" r:id="rId23"/>
+    <p:sldId id="1208" r:id="rId24"/>
+    <p:sldId id="1013" r:id="rId25"/>
+    <p:sldId id="934" r:id="rId26"/>
+    <p:sldId id="1186" r:id="rId27"/>
   </p:sldIdLst>
   <p:sldSz cx="9144000" cy="5715000" type="screen16x10"/>
   <p:notesSz cx="6985000" cy="9283700"/>
@@ -165,6 +166,40 @@
     </a:lvl9pPr>
   </p:defaultTextStyle>
   <p:extLst>
+    <p:ext uri="{521415D9-36F7-43E2-AB2F-B90AF26B5E84}">
+      <p14:sectionLst xmlns:p14="http://schemas.microsoft.com/office/powerpoint/2010/main">
+        <p14:section name="Default Section" id="{16D8A546-0F94-4D38-A920-550BC779B53D}">
+          <p14:sldIdLst>
+            <p14:sldId id="901"/>
+            <p14:sldId id="903"/>
+            <p14:sldId id="1025"/>
+            <p14:sldId id="905"/>
+            <p14:sldId id="1207"/>
+            <p14:sldId id="1199"/>
+            <p14:sldId id="1200"/>
+            <p14:sldId id="906"/>
+            <p14:sldId id="1209"/>
+            <p14:sldId id="1028"/>
+            <p14:sldId id="1180"/>
+            <p14:sldId id="1181"/>
+            <p14:sldId id="1183"/>
+            <p14:sldId id="909"/>
+            <p14:sldId id="913"/>
+            <p14:sldId id="914"/>
+            <p14:sldId id="915"/>
+            <p14:sldId id="1029"/>
+            <p14:sldId id="1187"/>
+            <p14:sldId id="1007"/>
+            <p14:sldId id="1008"/>
+            <p14:sldId id="1191"/>
+            <p14:sldId id="1208"/>
+            <p14:sldId id="1013"/>
+            <p14:sldId id="934"/>
+            <p14:sldId id="1186"/>
+          </p14:sldIdLst>
+        </p14:section>
+      </p14:sectionLst>
+    </p:ext>
     <p:ext uri="{EFAFB233-063F-42B5-8137-9DF3F51BA10A}">
       <p15:sldGuideLst xmlns:p15="http://schemas.microsoft.com/office/powerpoint/2012/main">
         <p15:guide id="1" orient="horz" pos="3240">
@@ -637,10 +672,10 @@
           </a:ln>
           <a:extLst>
             <a:ext uri="{FAA26D3D-D897-4be2-8F04-BA451C77F1D7}">
-              <ma14:placeholderFlag xmlns="" xmlns:ma14="http://schemas.microsoft.com/office/mac/drawingml/2011/main" val="1"/>
+              <ma14:placeholderFlag xmlns:ma14="http://schemas.microsoft.com/office/mac/drawingml/2011/main" xmlns="" val="1"/>
             </a:ext>
             <a:ext uri="{909E8E84-426E-40dd-AFC4-6F175D3DCCD1}">
-              <a14:hiddenFill xmlns:a14="http://schemas.microsoft.com/office/drawing/2010/main" xmlns="">
+              <a14:hiddenFill xmlns="" xmlns:a14="http://schemas.microsoft.com/office/drawing/2010/main">
                 <a:solidFill>
                   <a:srgbClr val="FFFFFF"/>
                 </a:solidFill>
@@ -1003,14 +1038,14 @@
           <a:ln/>
           <a:extLst>
             <a:ext uri="{909E8E84-426E-40dd-AFC4-6F175D3DCCD1}">
-              <a14:hiddenFill xmlns="" xmlns:a14="http://schemas.microsoft.com/office/drawing/2010/main">
+              <a14:hiddenFill xmlns:a14="http://schemas.microsoft.com/office/drawing/2010/main" xmlns="">
                 <a:solidFill>
                   <a:srgbClr val="FFFFFF"/>
                 </a:solidFill>
               </a14:hiddenFill>
             </a:ext>
             <a:ext uri="{91240B29-F687-4f45-9708-019B960494DF}">
-              <a14:hiddenLine xmlns="" xmlns:a14="http://schemas.microsoft.com/office/drawing/2010/main" w="9525">
+              <a14:hiddenLine xmlns:a14="http://schemas.microsoft.com/office/drawing/2010/main" xmlns="" w="9525">
                 <a:solidFill>
                   <a:srgbClr val="000000"/>
                 </a:solidFill>
@@ -1241,17 +1276,17 @@
           <a:ln/>
           <a:extLst>
             <a:ext uri="{FAA26D3D-D897-4be2-8F04-BA451C77F1D7}">
-              <ma14:placeholderFlag xmlns:ma14="http://schemas.microsoft.com/office/mac/drawingml/2011/main" xmlns="" val="1"/>
+              <ma14:placeholderFlag xmlns="" xmlns:ma14="http://schemas.microsoft.com/office/mac/drawingml/2011/main" val="1"/>
             </a:ext>
             <a:ext uri="{909E8E84-426E-40dd-AFC4-6F175D3DCCD1}">
-              <a14:hiddenFill xmlns="" xmlns:a14="http://schemas.microsoft.com/office/drawing/2010/main">
+              <a14:hiddenFill xmlns:a14="http://schemas.microsoft.com/office/drawing/2010/main" xmlns="">
                 <a:solidFill>
                   <a:srgbClr val="FFFFFF"/>
                 </a:solidFill>
               </a14:hiddenFill>
             </a:ext>
             <a:ext uri="{91240B29-F687-4f45-9708-019B960494DF}">
-              <a14:hiddenLine xmlns="" xmlns:a14="http://schemas.microsoft.com/office/drawing/2010/main" w="9525">
+              <a14:hiddenLine xmlns:a14="http://schemas.microsoft.com/office/drawing/2010/main" xmlns="" w="9525">
                 <a:solidFill>
                   <a:srgbClr val="000000"/>
                 </a:solidFill>
@@ -1299,21 +1334,23 @@
       </p:grpSpPr>
       <p:sp>
         <p:nvSpPr>
-          <p:cNvPr id="2" name="Slide Image Placeholder 1"/>
+          <p:cNvPr id="62466" name="Placeholder 2"/>
           <p:cNvSpPr>
-            <a:spLocks noGrp="1" noRot="1" noChangeAspect="1"/>
+            <a:spLocks noGrp="1" noRot="1" noChangeAspect="1" noChangeArrowheads="1" noTextEdit="1"/>
           </p:cNvSpPr>
           <p:nvPr>
             <p:ph type="sldImg"/>
           </p:nvPr>
         </p:nvSpPr>
-        <p:spPr/>
-      </p:sp>
-      <p:sp>
-        <p:nvSpPr>
-          <p:cNvPr id="3" name="Notes Placeholder 2"/>
+        <p:spPr>
+          <a:ln/>
+        </p:spPr>
+      </p:sp>
+      <p:sp>
+        <p:nvSpPr>
+          <p:cNvPr id="62467" name="Rectangle 3"/>
           <p:cNvSpPr>
-            <a:spLocks noGrp="1"/>
+            <a:spLocks noGrp="1" noChangeArrowheads="1"/>
           </p:cNvSpPr>
           <p:nvPr>
             <p:ph type="body" idx="1"/>
@@ -1326,44 +1363,28 @@
           <a:p>
             <a:r>
               <a:rPr lang="en-US" dirty="0"/>
-              <a:t>See this in action on the graph shown in red.  </a:t>
-            </a:r>
-          </a:p>
-        </p:txBody>
-      </p:sp>
-      <p:sp>
-        <p:nvSpPr>
-          <p:cNvPr id="4" name="Slide Number Placeholder 3"/>
-          <p:cNvSpPr>
-            <a:spLocks noGrp="1"/>
-          </p:cNvSpPr>
-          <p:nvPr>
-            <p:ph type="sldNum" sz="quarter" idx="5"/>
-          </p:nvPr>
-        </p:nvSpPr>
-        <p:spPr/>
-        <p:txBody>
-          <a:bodyPr/>
-          <a:lstStyle/>
-          <a:p>
-            <a:pPr>
-              <a:defRPr/>
-            </a:pPr>
-            <a:fld id="{45412121-731D-1546-9AB4-9CB6A8CF8847}" type="slidenum">
-              <a:rPr lang="en-US" smtClean="0"/>
-              <a:pPr>
-                <a:defRPr/>
-              </a:pPr>
-              <a:t>17</a:t>
-            </a:fld>
-            <a:endParaRPr lang="en-US"/>
+              <a:t>BFS is a very simple algorithm that allows you to to traverse a graph at increasingly greater distances from the starting node.</a:t>
+            </a:r>
+          </a:p>
+          <a:p>
+            <a:r>
+              <a:rPr lang="en-US" dirty="0"/>
+              <a:t>There are also other algorithms to traverse the entire graph, e.g. </a:t>
+            </a:r>
+            <a:r>
+              <a:rPr lang="en-US" dirty="0">
+                <a:latin typeface="ヒラギノ角ゴ Pro W3" charset="-128"/>
+              </a:rPr>
+              <a:t> Depth-First Search.</a:t>
+            </a:r>
+            <a:endParaRPr lang="en-US" dirty="0"/>
           </a:p>
         </p:txBody>
       </p:sp>
     </p:spTree>
     <p:extLst>
       <p:ext uri="{BB962C8B-B14F-4D97-AF65-F5344CB8AC3E}">
-        <p14:creationId xmlns:p14="http://schemas.microsoft.com/office/powerpoint/2010/main" val="2338762926"/>
+        <p14:creationId xmlns:p14="http://schemas.microsoft.com/office/powerpoint/2010/main" val="34520043"/>
       </p:ext>
     </p:extLst>
   </p:cSld>
@@ -1414,12 +1435,14 @@
         </p:nvSpPr>
         <p:spPr/>
         <p:txBody>
-          <a:bodyPr/>
+          <a:bodyPr>
+            <a:normAutofit/>
+          </a:bodyPr>
           <a:lstStyle/>
           <a:p>
             <a:r>
               <a:rPr lang="en-US" dirty="0"/>
-              <a:t>How can we run this on the cloud?  We can’t use the queue because it forces a sequence in terms of how nodes are visited.  It also ensures that each node is visited exactly once, which we are going to give up on a bit in the parallel Spark version.</a:t>
+              <a:t>Start at some node, and look at outgoing edges.  The nodes at the end of these edges are called the “frontier” (shown in red, the visited nodes are in blue).  Once the red nodes become blue, the white nodes become red.  Make sure we don’t backtrack by making sure that the frontier nodes have not already been visited.</a:t>
             </a:r>
           </a:p>
         </p:txBody>
@@ -1431,7 +1454,7 @@
             <a:spLocks noGrp="1"/>
           </p:cNvSpPr>
           <p:nvPr>
-            <p:ph type="sldNum" sz="quarter" idx="5"/>
+            <p:ph type="sldNum" sz="quarter" idx="10"/>
           </p:nvPr>
         </p:nvSpPr>
         <p:spPr/>
@@ -1439,15 +1462,10 @@
           <a:bodyPr/>
           <a:lstStyle/>
           <a:p>
-            <a:pPr>
-              <a:defRPr/>
-            </a:pPr>
-            <a:fld id="{45412121-731D-1546-9AB4-9CB6A8CF8847}" type="slidenum">
+            <a:fld id="{993D7CA6-FEAC-4FCE-9F51-EE080B9A6D10}" type="slidenum">
               <a:rPr lang="en-US" smtClean="0"/>
-              <a:pPr>
-                <a:defRPr/>
-              </a:pPr>
-              <a:t>18</a:t>
+              <a:pPr/>
+              <a:t>16</a:t>
             </a:fld>
             <a:endParaRPr lang="en-US"/>
           </a:p>
@@ -1456,7 +1474,7 @@
     </p:spTree>
     <p:extLst>
       <p:ext uri="{BB962C8B-B14F-4D97-AF65-F5344CB8AC3E}">
-        <p14:creationId xmlns:p14="http://schemas.microsoft.com/office/powerpoint/2010/main" val="3003642477"/>
+        <p14:creationId xmlns:p14="http://schemas.microsoft.com/office/powerpoint/2010/main" val="220819277"/>
       </p:ext>
     </p:extLst>
   </p:cSld>
@@ -1507,10 +1525,15 @@
         </p:nvSpPr>
         <p:spPr/>
         <p:txBody>
-          <a:bodyPr/>
+          <a:bodyPr>
+            <a:normAutofit/>
+          </a:bodyPr>
           <a:lstStyle/>
           <a:p>
-            <a:endParaRPr lang="en-US" dirty="0"/>
+            <a:r>
+              <a:rPr lang="en-US" dirty="0"/>
+              <a:t>Here is the centralized algorithm.  Visit nodes in order of the queue, will always visit closer nodes before nodes that are further away. </a:t>
+            </a:r>
           </a:p>
         </p:txBody>
       </p:sp>
@@ -1521,7 +1544,7 @@
             <a:spLocks noGrp="1"/>
           </p:cNvSpPr>
           <p:nvPr>
-            <p:ph type="sldNum" sz="quarter" idx="5"/>
+            <p:ph type="sldNum" sz="quarter" idx="10"/>
           </p:nvPr>
         </p:nvSpPr>
         <p:spPr/>
@@ -1529,15 +1552,10 @@
           <a:bodyPr/>
           <a:lstStyle/>
           <a:p>
-            <a:pPr>
-              <a:defRPr/>
-            </a:pPr>
-            <a:fld id="{45412121-731D-1546-9AB4-9CB6A8CF8847}" type="slidenum">
+            <a:fld id="{993D7CA6-FEAC-4FCE-9F51-EE080B9A6D10}" type="slidenum">
               <a:rPr lang="en-US" smtClean="0"/>
-              <a:pPr>
-                <a:defRPr/>
-              </a:pPr>
-              <a:t>19</a:t>
+              <a:pPr/>
+              <a:t>17</a:t>
             </a:fld>
             <a:endParaRPr lang="en-US"/>
           </a:p>
@@ -1546,7 +1564,7 @@
     </p:spTree>
     <p:extLst>
       <p:ext uri="{BB962C8B-B14F-4D97-AF65-F5344CB8AC3E}">
-        <p14:creationId xmlns:p14="http://schemas.microsoft.com/office/powerpoint/2010/main" val="1997081318"/>
+        <p14:creationId xmlns:p14="http://schemas.microsoft.com/office/powerpoint/2010/main" val="592604860"/>
       </p:ext>
     </p:extLst>
   </p:cSld>
@@ -1602,7 +1620,7 @@
           <a:p>
             <a:r>
               <a:rPr lang="en-US" dirty="0"/>
-              <a:t>Friend recommendations.</a:t>
+              <a:t>See this in action on the graph shown in red.  </a:t>
             </a:r>
           </a:p>
         </p:txBody>
@@ -1630,7 +1648,7 @@
               <a:pPr>
                 <a:defRPr/>
               </a:pPr>
-              <a:t>21</a:t>
+              <a:t>18</a:t>
             </a:fld>
             <a:endParaRPr lang="en-US"/>
           </a:p>
@@ -1639,7 +1657,7 @@
     </p:spTree>
     <p:extLst>
       <p:ext uri="{BB962C8B-B14F-4D97-AF65-F5344CB8AC3E}">
-        <p14:creationId xmlns:p14="http://schemas.microsoft.com/office/powerpoint/2010/main" val="3618748662"/>
+        <p14:creationId xmlns:p14="http://schemas.microsoft.com/office/powerpoint/2010/main" val="2338762926"/>
       </p:ext>
     </p:extLst>
   </p:cSld>
@@ -1695,8 +1713,17 @@
           <a:p>
             <a:r>
               <a:rPr lang="en-US" dirty="0"/>
-              <a:t>Friend recommendations.</a:t>
-            </a:r>
+              <a:t>If appropriate, tease the notion of trying to do a </a:t>
+            </a:r>
+            <a:r>
+              <a:rPr lang="en-US" b="1" dirty="0"/>
+              <a:t>parallel</a:t>
+            </a:r>
+            <a:r>
+              <a:rPr lang="en-US" b="0" dirty="0"/>
+              <a:t> breadth-first search.  This is in the Scalable Data Processing module.</a:t>
+            </a:r>
+            <a:endParaRPr lang="en-US" dirty="0"/>
           </a:p>
         </p:txBody>
       </p:sp>
@@ -1723,7 +1750,7 @@
               <a:pPr>
                 <a:defRPr/>
               </a:pPr>
-              <a:t>22</a:t>
+              <a:t>19</a:t>
             </a:fld>
             <a:endParaRPr lang="en-US"/>
           </a:p>
@@ -1732,7 +1759,7 @@
     </p:spTree>
     <p:extLst>
       <p:ext uri="{BB962C8B-B14F-4D97-AF65-F5344CB8AC3E}">
-        <p14:creationId xmlns:p14="http://schemas.microsoft.com/office/powerpoint/2010/main" val="1791302355"/>
+        <p14:creationId xmlns:p14="http://schemas.microsoft.com/office/powerpoint/2010/main" val="3003642477"/>
       </p:ext>
     </p:extLst>
   </p:cSld>
@@ -1786,9 +1813,192 @@
           <a:bodyPr/>
           <a:lstStyle/>
           <a:p>
+            <a:endParaRPr lang="en-US" dirty="0"/>
+          </a:p>
+        </p:txBody>
+      </p:sp>
+      <p:sp>
+        <p:nvSpPr>
+          <p:cNvPr id="4" name="Slide Number Placeholder 3"/>
+          <p:cNvSpPr>
+            <a:spLocks noGrp="1"/>
+          </p:cNvSpPr>
+          <p:nvPr>
+            <p:ph type="sldNum" sz="quarter" idx="5"/>
+          </p:nvPr>
+        </p:nvSpPr>
+        <p:spPr/>
+        <p:txBody>
+          <a:bodyPr/>
+          <a:lstStyle/>
+          <a:p>
+            <a:pPr>
+              <a:defRPr/>
+            </a:pPr>
+            <a:fld id="{45412121-731D-1546-9AB4-9CB6A8CF8847}" type="slidenum">
+              <a:rPr lang="en-US" smtClean="0"/>
+              <a:pPr>
+                <a:defRPr/>
+              </a:pPr>
+              <a:t>20</a:t>
+            </a:fld>
+            <a:endParaRPr lang="en-US"/>
+          </a:p>
+        </p:txBody>
+      </p:sp>
+    </p:spTree>
+    <p:extLst>
+      <p:ext uri="{BB962C8B-B14F-4D97-AF65-F5344CB8AC3E}">
+        <p14:creationId xmlns:p14="http://schemas.microsoft.com/office/powerpoint/2010/main" val="1997081318"/>
+      </p:ext>
+    </p:extLst>
+  </p:cSld>
+  <p:clrMapOvr>
+    <a:masterClrMapping/>
+  </p:clrMapOvr>
+</p:notes>
+</file>
+
+<file path=ppt/notesSlides/notesSlide16.xml><?xml version="1.0" encoding="utf-8"?>
+<p:notes xmlns:a="http://schemas.openxmlformats.org/drawingml/2006/main" xmlns:r="http://schemas.openxmlformats.org/officeDocument/2006/relationships" xmlns:p="http://schemas.openxmlformats.org/presentationml/2006/main">
+  <p:cSld>
+    <p:spTree>
+      <p:nvGrpSpPr>
+        <p:cNvPr id="1" name=""/>
+        <p:cNvGrpSpPr/>
+        <p:nvPr/>
+      </p:nvGrpSpPr>
+      <p:grpSpPr>
+        <a:xfrm>
+          <a:off x="0" y="0"/>
+          <a:ext cx="0" cy="0"/>
+          <a:chOff x="0" y="0"/>
+          <a:chExt cx="0" cy="0"/>
+        </a:xfrm>
+      </p:grpSpPr>
+      <p:sp>
+        <p:nvSpPr>
+          <p:cNvPr id="2" name="Slide Image Placeholder 1"/>
+          <p:cNvSpPr>
+            <a:spLocks noGrp="1" noRot="1" noChangeAspect="1"/>
+          </p:cNvSpPr>
+          <p:nvPr>
+            <p:ph type="sldImg"/>
+          </p:nvPr>
+        </p:nvSpPr>
+        <p:spPr/>
+      </p:sp>
+      <p:sp>
+        <p:nvSpPr>
+          <p:cNvPr id="3" name="Notes Placeholder 2"/>
+          <p:cNvSpPr>
+            <a:spLocks noGrp="1"/>
+          </p:cNvSpPr>
+          <p:nvPr>
+            <p:ph type="body" idx="1"/>
+          </p:nvPr>
+        </p:nvSpPr>
+        <p:spPr/>
+        <p:txBody>
+          <a:bodyPr/>
+          <a:lstStyle/>
+          <a:p>
             <a:r>
               <a:rPr lang="en-US" dirty="0"/>
-              <a:t>For many years, this was the basic algorithm used by Facebook.</a:t>
+              <a:t>Friend recommendations.</a:t>
+            </a:r>
+          </a:p>
+        </p:txBody>
+      </p:sp>
+      <p:sp>
+        <p:nvSpPr>
+          <p:cNvPr id="4" name="Slide Number Placeholder 3"/>
+          <p:cNvSpPr>
+            <a:spLocks noGrp="1"/>
+          </p:cNvSpPr>
+          <p:nvPr>
+            <p:ph type="sldNum" sz="quarter" idx="5"/>
+          </p:nvPr>
+        </p:nvSpPr>
+        <p:spPr/>
+        <p:txBody>
+          <a:bodyPr/>
+          <a:lstStyle/>
+          <a:p>
+            <a:pPr>
+              <a:defRPr/>
+            </a:pPr>
+            <a:fld id="{45412121-731D-1546-9AB4-9CB6A8CF8847}" type="slidenum">
+              <a:rPr lang="en-US" smtClean="0"/>
+              <a:pPr>
+                <a:defRPr/>
+              </a:pPr>
+              <a:t>22</a:t>
+            </a:fld>
+            <a:endParaRPr lang="en-US"/>
+          </a:p>
+        </p:txBody>
+      </p:sp>
+    </p:spTree>
+    <p:extLst>
+      <p:ext uri="{BB962C8B-B14F-4D97-AF65-F5344CB8AC3E}">
+        <p14:creationId xmlns:p14="http://schemas.microsoft.com/office/powerpoint/2010/main" val="3618748662"/>
+      </p:ext>
+    </p:extLst>
+  </p:cSld>
+  <p:clrMapOvr>
+    <a:masterClrMapping/>
+  </p:clrMapOvr>
+</p:notes>
+</file>
+
+<file path=ppt/notesSlides/notesSlide17.xml><?xml version="1.0" encoding="utf-8"?>
+<p:notes xmlns:a="http://schemas.openxmlformats.org/drawingml/2006/main" xmlns:r="http://schemas.openxmlformats.org/officeDocument/2006/relationships" xmlns:p="http://schemas.openxmlformats.org/presentationml/2006/main">
+  <p:cSld>
+    <p:spTree>
+      <p:nvGrpSpPr>
+        <p:cNvPr id="1" name=""/>
+        <p:cNvGrpSpPr/>
+        <p:nvPr/>
+      </p:nvGrpSpPr>
+      <p:grpSpPr>
+        <a:xfrm>
+          <a:off x="0" y="0"/>
+          <a:ext cx="0" cy="0"/>
+          <a:chOff x="0" y="0"/>
+          <a:chExt cx="0" cy="0"/>
+        </a:xfrm>
+      </p:grpSpPr>
+      <p:sp>
+        <p:nvSpPr>
+          <p:cNvPr id="2" name="Slide Image Placeholder 1"/>
+          <p:cNvSpPr>
+            <a:spLocks noGrp="1" noRot="1" noChangeAspect="1"/>
+          </p:cNvSpPr>
+          <p:nvPr>
+            <p:ph type="sldImg"/>
+          </p:nvPr>
+        </p:nvSpPr>
+        <p:spPr/>
+      </p:sp>
+      <p:sp>
+        <p:nvSpPr>
+          <p:cNvPr id="3" name="Notes Placeholder 2"/>
+          <p:cNvSpPr>
+            <a:spLocks noGrp="1"/>
+          </p:cNvSpPr>
+          <p:nvPr>
+            <p:ph type="body" idx="1"/>
+          </p:nvPr>
+        </p:nvSpPr>
+        <p:spPr/>
+        <p:txBody>
+          <a:bodyPr/>
+          <a:lstStyle/>
+          <a:p>
+            <a:r>
+              <a:rPr lang="en-US" dirty="0"/>
+              <a:t>Friend recommendations.</a:t>
             </a:r>
           </a:p>
         </p:txBody>
@@ -1817,6 +2027,99 @@
                 <a:defRPr/>
               </a:pPr>
               <a:t>23</a:t>
+            </a:fld>
+            <a:endParaRPr lang="en-US"/>
+          </a:p>
+        </p:txBody>
+      </p:sp>
+    </p:spTree>
+    <p:extLst>
+      <p:ext uri="{BB962C8B-B14F-4D97-AF65-F5344CB8AC3E}">
+        <p14:creationId xmlns:p14="http://schemas.microsoft.com/office/powerpoint/2010/main" val="1791302355"/>
+      </p:ext>
+    </p:extLst>
+  </p:cSld>
+  <p:clrMapOvr>
+    <a:masterClrMapping/>
+  </p:clrMapOvr>
+</p:notes>
+</file>
+
+<file path=ppt/notesSlides/notesSlide18.xml><?xml version="1.0" encoding="utf-8"?>
+<p:notes xmlns:a="http://schemas.openxmlformats.org/drawingml/2006/main" xmlns:r="http://schemas.openxmlformats.org/officeDocument/2006/relationships" xmlns:p="http://schemas.openxmlformats.org/presentationml/2006/main">
+  <p:cSld>
+    <p:spTree>
+      <p:nvGrpSpPr>
+        <p:cNvPr id="1" name=""/>
+        <p:cNvGrpSpPr/>
+        <p:nvPr/>
+      </p:nvGrpSpPr>
+      <p:grpSpPr>
+        <a:xfrm>
+          <a:off x="0" y="0"/>
+          <a:ext cx="0" cy="0"/>
+          <a:chOff x="0" y="0"/>
+          <a:chExt cx="0" cy="0"/>
+        </a:xfrm>
+      </p:grpSpPr>
+      <p:sp>
+        <p:nvSpPr>
+          <p:cNvPr id="2" name="Slide Image Placeholder 1"/>
+          <p:cNvSpPr>
+            <a:spLocks noGrp="1" noRot="1" noChangeAspect="1"/>
+          </p:cNvSpPr>
+          <p:nvPr>
+            <p:ph type="sldImg"/>
+          </p:nvPr>
+        </p:nvSpPr>
+        <p:spPr/>
+      </p:sp>
+      <p:sp>
+        <p:nvSpPr>
+          <p:cNvPr id="3" name="Notes Placeholder 2"/>
+          <p:cNvSpPr>
+            <a:spLocks noGrp="1"/>
+          </p:cNvSpPr>
+          <p:nvPr>
+            <p:ph type="body" idx="1"/>
+          </p:nvPr>
+        </p:nvSpPr>
+        <p:spPr/>
+        <p:txBody>
+          <a:bodyPr/>
+          <a:lstStyle/>
+          <a:p>
+            <a:r>
+              <a:rPr lang="en-US" dirty="0"/>
+              <a:t>For many years, this was the basic scheme for friend recommendation used by Facebook.</a:t>
+            </a:r>
+          </a:p>
+        </p:txBody>
+      </p:sp>
+      <p:sp>
+        <p:nvSpPr>
+          <p:cNvPr id="4" name="Slide Number Placeholder 3"/>
+          <p:cNvSpPr>
+            <a:spLocks noGrp="1"/>
+          </p:cNvSpPr>
+          <p:nvPr>
+            <p:ph type="sldNum" sz="quarter" idx="5"/>
+          </p:nvPr>
+        </p:nvSpPr>
+        <p:spPr/>
+        <p:txBody>
+          <a:bodyPr/>
+          <a:lstStyle/>
+          <a:p>
+            <a:pPr>
+              <a:defRPr/>
+            </a:pPr>
+            <a:fld id="{45412121-731D-1546-9AB4-9CB6A8CF8847}" type="slidenum">
+              <a:rPr lang="en-US" smtClean="0"/>
+              <a:pPr>
+                <a:defRPr/>
+              </a:pPr>
+              <a:t>24</a:t>
             </a:fld>
             <a:endParaRPr lang="en-US"/>
           </a:p>
@@ -1854,23 +2157,21 @@
       </p:grpSpPr>
       <p:sp>
         <p:nvSpPr>
-          <p:cNvPr id="66562" name="Placeholder 2"/>
+          <p:cNvPr id="2" name="Slide Image Placeholder 1"/>
           <p:cNvSpPr>
-            <a:spLocks noGrp="1" noRot="1" noChangeAspect="1" noChangeArrowheads="1" noTextEdit="1"/>
+            <a:spLocks noGrp="1" noRot="1" noChangeAspect="1"/>
           </p:cNvSpPr>
           <p:nvPr>
             <p:ph type="sldImg"/>
           </p:nvPr>
         </p:nvSpPr>
-        <p:spPr>
-          <a:ln/>
-        </p:spPr>
-      </p:sp>
-      <p:sp>
-        <p:nvSpPr>
-          <p:cNvPr id="66563" name="Rectangle 3"/>
+        <p:spPr/>
+      </p:sp>
+      <p:sp>
+        <p:nvSpPr>
+          <p:cNvPr id="3" name="Notes Placeholder 2"/>
           <p:cNvSpPr>
-            <a:spLocks noGrp="1" noChangeArrowheads="1"/>
+            <a:spLocks noGrp="1"/>
           </p:cNvSpPr>
           <p:nvPr>
             <p:ph type="body" idx="1"/>
@@ -1883,15 +2184,53 @@
           <a:p>
             <a:r>
               <a:rPr lang="en-US" dirty="0"/>
-              <a:t>Two ways of encoding a graph:  adjacency list. </a:t>
-            </a:r>
+              <a:t>We’re all familiar with social networks.  But on a daily basis we navigate road networks, and we interact with others on computer networks.</a:t>
+            </a:r>
+          </a:p>
+          <a:p>
+            <a:endParaRPr lang="en-US" dirty="0"/>
+          </a:p>
+          <a:p>
+            <a:r>
+              <a:rPr lang="en-US" dirty="0"/>
+              <a:t>Our brains have internal neural connectivity in a network known as the connectome.</a:t>
+            </a:r>
+          </a:p>
+        </p:txBody>
+      </p:sp>
+      <p:sp>
+        <p:nvSpPr>
+          <p:cNvPr id="4" name="Slide Number Placeholder 3"/>
+          <p:cNvSpPr>
+            <a:spLocks noGrp="1"/>
+          </p:cNvSpPr>
+          <p:nvPr>
+            <p:ph type="sldNum" sz="quarter" idx="5"/>
+          </p:nvPr>
+        </p:nvSpPr>
+        <p:spPr/>
+        <p:txBody>
+          <a:bodyPr/>
+          <a:lstStyle/>
+          <a:p>
+            <a:pPr>
+              <a:defRPr/>
+            </a:pPr>
+            <a:fld id="{45412121-731D-1546-9AB4-9CB6A8CF8847}" type="slidenum">
+              <a:rPr lang="en-US" smtClean="0"/>
+              <a:pPr>
+                <a:defRPr/>
+              </a:pPr>
+              <a:t>2</a:t>
+            </a:fld>
+            <a:endParaRPr lang="en-US"/>
           </a:p>
         </p:txBody>
       </p:sp>
     </p:spTree>
     <p:extLst>
       <p:ext uri="{BB962C8B-B14F-4D97-AF65-F5344CB8AC3E}">
-        <p14:creationId xmlns:p14="http://schemas.microsoft.com/office/powerpoint/2010/main" val="2309267330"/>
+        <p14:creationId xmlns:p14="http://schemas.microsoft.com/office/powerpoint/2010/main" val="3656861706"/>
       </p:ext>
     </p:extLst>
   </p:cSld>
@@ -1920,23 +2259,21 @@
       </p:grpSpPr>
       <p:sp>
         <p:nvSpPr>
-          <p:cNvPr id="66562" name="Placeholder 2"/>
+          <p:cNvPr id="2" name="Slide Image Placeholder 1"/>
           <p:cNvSpPr>
-            <a:spLocks noGrp="1" noRot="1" noChangeAspect="1" noChangeArrowheads="1" noTextEdit="1"/>
+            <a:spLocks noGrp="1" noRot="1" noChangeAspect="1"/>
           </p:cNvSpPr>
           <p:nvPr>
             <p:ph type="sldImg"/>
           </p:nvPr>
         </p:nvSpPr>
-        <p:spPr>
-          <a:ln/>
-        </p:spPr>
-      </p:sp>
-      <p:sp>
-        <p:nvSpPr>
-          <p:cNvPr id="66563" name="Rectangle 3"/>
+        <p:spPr/>
+      </p:sp>
+      <p:sp>
+        <p:nvSpPr>
+          <p:cNvPr id="3" name="Notes Placeholder 2"/>
           <p:cNvSpPr>
-            <a:spLocks noGrp="1" noChangeArrowheads="1"/>
+            <a:spLocks noGrp="1"/>
           </p:cNvSpPr>
           <p:nvPr>
             <p:ph type="body" idx="1"/>
@@ -1949,15 +2286,78 @@
           <a:p>
             <a:r>
               <a:rPr lang="en-US" dirty="0"/>
-              <a:t>Two ways of encoding a graph:  adjacency list. </a:t>
-            </a:r>
+              <a:t>This graph includes a </a:t>
+            </a:r>
+            <a:r>
+              <a:rPr lang="en-US" i="1" dirty="0"/>
+              <a:t>directed</a:t>
+            </a:r>
+            <a:r>
+              <a:rPr lang="en-US" i="0" dirty="0"/>
+              <a:t> and </a:t>
+            </a:r>
+            <a:r>
+              <a:rPr lang="en-US" i="1" dirty="0"/>
+              <a:t>labeled </a:t>
+            </a:r>
+            <a:r>
+              <a:rPr lang="en-US" i="0" dirty="0"/>
+              <a:t>edge, showing that we can get from n1 to n2 via an edge with a label.  Imagine, e.g., that this represents a plane flight from city n1 to city n2.</a:t>
+            </a:r>
+          </a:p>
+          <a:p>
+            <a:endParaRPr lang="en-US" i="0" dirty="0"/>
+          </a:p>
+          <a:p>
+            <a:r>
+              <a:rPr lang="en-US" i="0" dirty="0"/>
+              <a:t>We can also have </a:t>
+            </a:r>
+            <a:r>
+              <a:rPr lang="en-US" i="1" dirty="0"/>
+              <a:t>undirected</a:t>
+            </a:r>
+            <a:r>
+              <a:rPr lang="en-US" i="0" dirty="0"/>
+              <a:t> edges where we can always go in either direction.  Edges may optionally have labels, costs, weights, distances, and the like.  Nodes may have optional properties (such as your name and occupation in a social network).</a:t>
+            </a:r>
+            <a:endParaRPr lang="en-US" dirty="0"/>
+          </a:p>
+        </p:txBody>
+      </p:sp>
+      <p:sp>
+        <p:nvSpPr>
+          <p:cNvPr id="4" name="Slide Number Placeholder 3"/>
+          <p:cNvSpPr>
+            <a:spLocks noGrp="1"/>
+          </p:cNvSpPr>
+          <p:nvPr>
+            <p:ph type="sldNum" sz="quarter" idx="5"/>
+          </p:nvPr>
+        </p:nvSpPr>
+        <p:spPr/>
+        <p:txBody>
+          <a:bodyPr/>
+          <a:lstStyle/>
+          <a:p>
+            <a:pPr>
+              <a:defRPr/>
+            </a:pPr>
+            <a:fld id="{45412121-731D-1546-9AB4-9CB6A8CF8847}" type="slidenum">
+              <a:rPr lang="en-US" smtClean="0"/>
+              <a:pPr>
+                <a:defRPr/>
+              </a:pPr>
+              <a:t>3</a:t>
+            </a:fld>
+            <a:endParaRPr lang="en-US"/>
           </a:p>
         </p:txBody>
       </p:sp>
     </p:spTree>
     <p:extLst>
       <p:ext uri="{BB962C8B-B14F-4D97-AF65-F5344CB8AC3E}">
-        <p14:creationId xmlns:p14="http://schemas.microsoft.com/office/powerpoint/2010/main" val="209188384"/>
+        <p14:creationId xmlns:p14="http://schemas.microsoft.com/office/powerpoint/2010/main" val="264966619"/>
       </p:ext>
     </p:extLst>
   </p:cSld>
@@ -1986,23 +2386,21 @@
       </p:grpSpPr>
       <p:sp>
         <p:nvSpPr>
-          <p:cNvPr id="66562" name="Placeholder 2"/>
+          <p:cNvPr id="2" name="Slide Image Placeholder 1"/>
           <p:cNvSpPr>
-            <a:spLocks noGrp="1" noRot="1" noChangeAspect="1" noChangeArrowheads="1" noTextEdit="1"/>
+            <a:spLocks noGrp="1" noRot="1" noChangeAspect="1"/>
           </p:cNvSpPr>
           <p:nvPr>
             <p:ph type="sldImg"/>
           </p:nvPr>
         </p:nvSpPr>
-        <p:spPr>
-          <a:ln/>
-        </p:spPr>
-      </p:sp>
-      <p:sp>
-        <p:nvSpPr>
-          <p:cNvPr id="66563" name="Rectangle 3"/>
+        <p:spPr/>
+      </p:sp>
+      <p:sp>
+        <p:nvSpPr>
+          <p:cNvPr id="3" name="Notes Placeholder 2"/>
           <p:cNvSpPr>
-            <a:spLocks noGrp="1" noChangeArrowheads="1"/>
+            <a:spLocks noGrp="1"/>
           </p:cNvSpPr>
           <p:nvPr>
             <p:ph type="body" idx="1"/>
@@ -2015,23 +2413,61 @@
           <a:p>
             <a:r>
               <a:rPr lang="en-US" dirty="0"/>
-              <a:t>We’ll focus on the set of edges as a </a:t>
-            </a:r>
-            <a:r>
-              <a:rPr lang="en-US" dirty="0" err="1"/>
-              <a:t>dataframe</a:t>
+              <a:t>The most important notions here are the </a:t>
+            </a:r>
+            <a:r>
+              <a:rPr lang="en-US" b="1" dirty="0"/>
+              <a:t>degree</a:t>
             </a:r>
             <a:r>
               <a:rPr lang="en-US" dirty="0"/>
-              <a:t>.</a:t>
-            </a:r>
+              <a:t> (how connected a node is) and a notion of a </a:t>
+            </a:r>
+            <a:r>
+              <a:rPr lang="en-US" b="1" dirty="0"/>
+              <a:t>path</a:t>
+            </a:r>
+            <a:r>
+              <a:rPr lang="en-US" b="0" dirty="0"/>
+              <a:t>, a sequence of edge traversals (thus, adjacent vertex traversals).</a:t>
+            </a:r>
+            <a:endParaRPr lang="en-US" dirty="0"/>
+          </a:p>
+        </p:txBody>
+      </p:sp>
+      <p:sp>
+        <p:nvSpPr>
+          <p:cNvPr id="4" name="Slide Number Placeholder 3"/>
+          <p:cNvSpPr>
+            <a:spLocks noGrp="1"/>
+          </p:cNvSpPr>
+          <p:nvPr>
+            <p:ph type="sldNum" sz="quarter" idx="5"/>
+          </p:nvPr>
+        </p:nvSpPr>
+        <p:spPr/>
+        <p:txBody>
+          <a:bodyPr/>
+          <a:lstStyle/>
+          <a:p>
+            <a:pPr>
+              <a:defRPr/>
+            </a:pPr>
+            <a:fld id="{45412121-731D-1546-9AB4-9CB6A8CF8847}" type="slidenum">
+              <a:rPr lang="en-US" smtClean="0"/>
+              <a:pPr>
+                <a:defRPr/>
+              </a:pPr>
+              <a:t>4</a:t>
+            </a:fld>
+            <a:endParaRPr lang="en-US"/>
           </a:p>
         </p:txBody>
       </p:sp>
     </p:spTree>
     <p:extLst>
       <p:ext uri="{BB962C8B-B14F-4D97-AF65-F5344CB8AC3E}">
-        <p14:creationId xmlns:p14="http://schemas.microsoft.com/office/powerpoint/2010/main" val="3068835697"/>
+        <p14:creationId xmlns:p14="http://schemas.microsoft.com/office/powerpoint/2010/main" val="244087354"/>
       </p:ext>
     </p:extLst>
   </p:cSld>
@@ -2089,7 +2525,7 @@
           <a:p>
             <a:r>
               <a:rPr lang="en-US" dirty="0"/>
-              <a:t>The third version is an adjacency matrix, which we will not be using.</a:t>
+              <a:t>Two ways of encoding a graph:  adjacency list. </a:t>
             </a:r>
           </a:p>
         </p:txBody>
@@ -2097,7 +2533,7 @@
     </p:spTree>
     <p:extLst>
       <p:ext uri="{BB962C8B-B14F-4D97-AF65-F5344CB8AC3E}">
-        <p14:creationId xmlns:p14="http://schemas.microsoft.com/office/powerpoint/2010/main" val="1933811655"/>
+        <p14:creationId xmlns:p14="http://schemas.microsoft.com/office/powerpoint/2010/main" val="2309267330"/>
       </p:ext>
     </p:extLst>
   </p:cSld>
@@ -2126,21 +2562,23 @@
       </p:grpSpPr>
       <p:sp>
         <p:nvSpPr>
-          <p:cNvPr id="2" name="Slide Image Placeholder 1"/>
+          <p:cNvPr id="66562" name="Placeholder 2"/>
           <p:cNvSpPr>
-            <a:spLocks noGrp="1" noRot="1" noChangeAspect="1"/>
+            <a:spLocks noGrp="1" noRot="1" noChangeAspect="1" noChangeArrowheads="1" noTextEdit="1"/>
           </p:cNvSpPr>
           <p:nvPr>
             <p:ph type="sldImg"/>
           </p:nvPr>
         </p:nvSpPr>
-        <p:spPr/>
-      </p:sp>
-      <p:sp>
-        <p:nvSpPr>
-          <p:cNvPr id="3" name="Notes Placeholder 2"/>
+        <p:spPr>
+          <a:ln/>
+        </p:spPr>
+      </p:sp>
+      <p:sp>
+        <p:nvSpPr>
+          <p:cNvPr id="66563" name="Rectangle 3"/>
           <p:cNvSpPr>
-            <a:spLocks noGrp="1"/>
+            <a:spLocks noGrp="1" noChangeArrowheads="1"/>
           </p:cNvSpPr>
           <p:nvPr>
             <p:ph type="body" idx="1"/>
@@ -2153,69 +2591,15 @@
           <a:p>
             <a:r>
               <a:rPr lang="en-US" dirty="0"/>
-              <a:t>Hint: we can call </a:t>
-            </a:r>
-            <a:r>
-              <a:rPr lang="en-US" dirty="0" err="1"/>
-              <a:t>edges.groupby</a:t>
-            </a:r>
-            <a:r>
-              <a:rPr lang="en-US" dirty="0"/>
-              <a:t>([‘from’]).count().</a:t>
-            </a:r>
-            <a:r>
-              <a:rPr lang="en-US" dirty="0" err="1"/>
-              <a:t>reset_index</a:t>
-            </a:r>
-            <a:r>
-              <a:rPr lang="en-US" dirty="0"/>
-              <a:t>() and the ‘to’ column will now include a count of outdegree for each </a:t>
-            </a:r>
-            <a:r>
-              <a:rPr lang="en-US" b="1" dirty="0"/>
-              <a:t>from</a:t>
-            </a:r>
-            <a:r>
-              <a:rPr lang="en-US" b="0" dirty="0"/>
-              <a:t> node.</a:t>
-            </a:r>
-            <a:endParaRPr lang="en-US" dirty="0"/>
-          </a:p>
-        </p:txBody>
-      </p:sp>
-      <p:sp>
-        <p:nvSpPr>
-          <p:cNvPr id="4" name="Slide Number Placeholder 3"/>
-          <p:cNvSpPr>
-            <a:spLocks noGrp="1"/>
-          </p:cNvSpPr>
-          <p:nvPr>
-            <p:ph type="sldNum" sz="quarter" idx="5"/>
-          </p:nvPr>
-        </p:nvSpPr>
-        <p:spPr/>
-        <p:txBody>
-          <a:bodyPr/>
-          <a:lstStyle/>
-          <a:p>
-            <a:pPr>
-              <a:defRPr/>
-            </a:pPr>
-            <a:fld id="{45412121-731D-1546-9AB4-9CB6A8CF8847}" type="slidenum">
-              <a:rPr lang="en-US" smtClean="0"/>
-              <a:pPr>
-                <a:defRPr/>
-              </a:pPr>
-              <a:t>11</a:t>
-            </a:fld>
-            <a:endParaRPr lang="en-US"/>
+              <a:t>Two ways of encoding a graph:  adjacency list. </a:t>
+            </a:r>
           </a:p>
         </p:txBody>
       </p:sp>
     </p:spTree>
     <p:extLst>
       <p:ext uri="{BB962C8B-B14F-4D97-AF65-F5344CB8AC3E}">
-        <p14:creationId xmlns:p14="http://schemas.microsoft.com/office/powerpoint/2010/main" val="3838242690"/>
+        <p14:creationId xmlns:p14="http://schemas.microsoft.com/office/powerpoint/2010/main" val="209188384"/>
       </p:ext>
     </p:extLst>
   </p:cSld>
@@ -2244,7 +2628,7 @@
       </p:grpSpPr>
       <p:sp>
         <p:nvSpPr>
-          <p:cNvPr id="62466" name="Placeholder 2"/>
+          <p:cNvPr id="66562" name="Placeholder 2"/>
           <p:cNvSpPr>
             <a:spLocks noGrp="1" noRot="1" noChangeAspect="1" noChangeArrowheads="1" noTextEdit="1"/>
           </p:cNvSpPr>
@@ -2258,7 +2642,7 @@
       </p:sp>
       <p:sp>
         <p:nvSpPr>
-          <p:cNvPr id="62467" name="Rectangle 3"/>
+          <p:cNvPr id="66563" name="Rectangle 3"/>
           <p:cNvSpPr>
             <a:spLocks noGrp="1" noChangeArrowheads="1"/>
           </p:cNvSpPr>
@@ -2273,28 +2657,23 @@
           <a:p>
             <a:r>
               <a:rPr lang="en-US" dirty="0"/>
-              <a:t>BFS is a very simple algorithm that allows you to to traverse a graph at increasingly greater distances from the starting node.</a:t>
-            </a:r>
-          </a:p>
-          <a:p>
+              <a:t>We’ll focus on the set of edges as a </a:t>
+            </a:r>
+            <a:r>
+              <a:rPr lang="en-US" dirty="0" err="1"/>
+              <a:t>dataframe</a:t>
+            </a:r>
             <a:r>
               <a:rPr lang="en-US" dirty="0"/>
-              <a:t>There are also other algorithms to traverse the entire graph, e.g. </a:t>
-            </a:r>
-            <a:r>
-              <a:rPr lang="en-US" dirty="0">
-                <a:latin typeface="ヒラギノ角ゴ Pro W3" charset="-128"/>
-              </a:rPr>
-              <a:t> Depth-First Search.</a:t>
-            </a:r>
-            <a:endParaRPr lang="en-US" dirty="0"/>
+              <a:t>.</a:t>
+            </a:r>
           </a:p>
         </p:txBody>
       </p:sp>
     </p:spTree>
     <p:extLst>
       <p:ext uri="{BB962C8B-B14F-4D97-AF65-F5344CB8AC3E}">
-        <p14:creationId xmlns:p14="http://schemas.microsoft.com/office/powerpoint/2010/main" val="34520043"/>
+        <p14:creationId xmlns:p14="http://schemas.microsoft.com/office/powerpoint/2010/main" val="3068835697"/>
       </p:ext>
     </p:extLst>
   </p:cSld>
@@ -2323,21 +2702,23 @@
       </p:grpSpPr>
       <p:sp>
         <p:nvSpPr>
-          <p:cNvPr id="2" name="Slide Image Placeholder 1"/>
+          <p:cNvPr id="66562" name="Placeholder 2"/>
           <p:cNvSpPr>
-            <a:spLocks noGrp="1" noRot="1" noChangeAspect="1"/>
+            <a:spLocks noGrp="1" noRot="1" noChangeAspect="1" noChangeArrowheads="1" noTextEdit="1"/>
           </p:cNvSpPr>
           <p:nvPr>
             <p:ph type="sldImg"/>
           </p:nvPr>
         </p:nvSpPr>
-        <p:spPr/>
-      </p:sp>
-      <p:sp>
-        <p:nvSpPr>
-          <p:cNvPr id="3" name="Notes Placeholder 2"/>
+        <p:spPr>
+          <a:ln/>
+        </p:spPr>
+      </p:sp>
+      <p:sp>
+        <p:nvSpPr>
+          <p:cNvPr id="66563" name="Rectangle 3"/>
           <p:cNvSpPr>
-            <a:spLocks noGrp="1"/>
+            <a:spLocks noGrp="1" noChangeArrowheads="1"/>
           </p:cNvSpPr>
           <p:nvPr>
             <p:ph type="body" idx="1"/>
@@ -2345,46 +2726,20 @@
         </p:nvSpPr>
         <p:spPr/>
         <p:txBody>
-          <a:bodyPr>
-            <a:normAutofit/>
-          </a:bodyPr>
-          <a:lstStyle/>
-          <a:p>
-            <a:r>
-              <a:rPr lang="en-US" dirty="0"/>
-              <a:t>Start at some node, and look at outgoing edges.  The nodes at the end of these edges are called the “frontier” (shown in red, the visited nodes are in blue).  Once the red nodes become blue, the white nodes become red.  Make sure we don’t backtrack by making sure that the frontier nodes have not already been visited.</a:t>
-            </a:r>
-          </a:p>
-        </p:txBody>
-      </p:sp>
-      <p:sp>
-        <p:nvSpPr>
-          <p:cNvPr id="4" name="Slide Number Placeholder 3"/>
-          <p:cNvSpPr>
-            <a:spLocks noGrp="1"/>
-          </p:cNvSpPr>
-          <p:nvPr>
-            <p:ph type="sldNum" sz="quarter" idx="10"/>
-          </p:nvPr>
-        </p:nvSpPr>
-        <p:spPr/>
-        <p:txBody>
           <a:bodyPr/>
           <a:lstStyle/>
           <a:p>
-            <a:fld id="{993D7CA6-FEAC-4FCE-9F51-EE080B9A6D10}" type="slidenum">
-              <a:rPr lang="en-US" smtClean="0"/>
-              <a:pPr/>
-              <a:t>15</a:t>
-            </a:fld>
-            <a:endParaRPr lang="en-US"/>
+            <a:r>
+              <a:rPr lang="en-US" dirty="0"/>
+              <a:t>The third version is an adjacency matrix, which we will use later in the course.</a:t>
+            </a:r>
           </a:p>
         </p:txBody>
       </p:sp>
     </p:spTree>
     <p:extLst>
       <p:ext uri="{BB962C8B-B14F-4D97-AF65-F5344CB8AC3E}">
-        <p14:creationId xmlns:p14="http://schemas.microsoft.com/office/powerpoint/2010/main" val="220819277"/>
+        <p14:creationId xmlns:p14="http://schemas.microsoft.com/office/powerpoint/2010/main" val="1933811655"/>
       </p:ext>
     </p:extLst>
   </p:cSld>
@@ -2435,15 +2790,38 @@
         </p:nvSpPr>
         <p:spPr/>
         <p:txBody>
-          <a:bodyPr>
-            <a:normAutofit/>
-          </a:bodyPr>
+          <a:bodyPr/>
           <a:lstStyle/>
           <a:p>
             <a:r>
               <a:rPr lang="en-US" dirty="0"/>
-              <a:t>Here is the centralized algorithm.  Visit nodes in order of the queue, will always visit closer nodes before nodes that are further away. </a:t>
-            </a:r>
+              <a:t>Hint: we can call </a:t>
+            </a:r>
+            <a:r>
+              <a:rPr lang="en-US" dirty="0" err="1"/>
+              <a:t>edges.groupby</a:t>
+            </a:r>
+            <a:r>
+              <a:rPr lang="en-US" dirty="0"/>
+              <a:t>([‘from’]).count().</a:t>
+            </a:r>
+            <a:r>
+              <a:rPr lang="en-US" dirty="0" err="1"/>
+              <a:t>reset_index</a:t>
+            </a:r>
+            <a:r>
+              <a:rPr lang="en-US" dirty="0"/>
+              <a:t>() and the ‘to’ column will now include a count of outdegree for each </a:t>
+            </a:r>
+            <a:r>
+              <a:rPr lang="en-US" b="1" dirty="0"/>
+              <a:t>from</a:t>
+            </a:r>
+            <a:r>
+              <a:rPr lang="en-US" b="0" dirty="0"/>
+              <a:t> node.</a:t>
+            </a:r>
+            <a:endParaRPr lang="en-US" dirty="0"/>
           </a:p>
         </p:txBody>
       </p:sp>
@@ -2454,7 +2832,7 @@
             <a:spLocks noGrp="1"/>
           </p:cNvSpPr>
           <p:nvPr>
-            <p:ph type="sldNum" sz="quarter" idx="10"/>
+            <p:ph type="sldNum" sz="quarter" idx="5"/>
           </p:nvPr>
         </p:nvSpPr>
         <p:spPr/>
@@ -2462,10 +2840,15 @@
           <a:bodyPr/>
           <a:lstStyle/>
           <a:p>
-            <a:fld id="{993D7CA6-FEAC-4FCE-9F51-EE080B9A6D10}" type="slidenum">
+            <a:pPr>
+              <a:defRPr/>
+            </a:pPr>
+            <a:fld id="{45412121-731D-1546-9AB4-9CB6A8CF8847}" type="slidenum">
               <a:rPr lang="en-US" smtClean="0"/>
-              <a:pPr/>
-              <a:t>16</a:t>
+              <a:pPr>
+                <a:defRPr/>
+              </a:pPr>
+              <a:t>12</a:t>
             </a:fld>
             <a:endParaRPr lang="en-US"/>
           </a:p>
@@ -2474,7 +2857,7 @@
     </p:spTree>
     <p:extLst>
       <p:ext uri="{BB962C8B-B14F-4D97-AF65-F5344CB8AC3E}">
-        <p14:creationId xmlns:p14="http://schemas.microsoft.com/office/powerpoint/2010/main" val="592604860"/>
+        <p14:creationId xmlns:p14="http://schemas.microsoft.com/office/powerpoint/2010/main" val="3838242690"/>
       </p:ext>
     </p:extLst>
   </p:cSld>
@@ -8803,17 +9186,17 @@
           </a:ln>
           <a:extLst>
             <a:ext uri="{FAA26D3D-D897-4be2-8F04-BA451C77F1D7}">
-              <ma14:placeholderFlag xmlns="" xmlns:ma14="http://schemas.microsoft.com/office/mac/drawingml/2011/main" val="1"/>
+              <ma14:placeholderFlag xmlns:ma14="http://schemas.microsoft.com/office/mac/drawingml/2011/main" xmlns="" val="1"/>
             </a:ext>
             <a:ext uri="{909E8E84-426E-40dd-AFC4-6F175D3DCCD1}">
-              <a14:hiddenFill xmlns:a14="http://schemas.microsoft.com/office/drawing/2010/main" xmlns="">
+              <a14:hiddenFill xmlns="" xmlns:a14="http://schemas.microsoft.com/office/drawing/2010/main">
                 <a:solidFill>
                   <a:srgbClr val="FFFFFF"/>
                 </a:solidFill>
               </a14:hiddenFill>
             </a:ext>
             <a:ext uri="{91240B29-F687-4f45-9708-019B960494DF}">
-              <a14:hiddenLine xmlns:a14="http://schemas.microsoft.com/office/drawing/2010/main" xmlns="" w="9525">
+              <a14:hiddenLine xmlns="" xmlns:a14="http://schemas.microsoft.com/office/drawing/2010/main" w="9525">
                 <a:solidFill>
                   <a:srgbClr val="000000"/>
                 </a:solidFill>
@@ -8864,17 +9247,17 @@
           </a:ln>
           <a:extLst>
             <a:ext uri="{FAA26D3D-D897-4be2-8F04-BA451C77F1D7}">
-              <ma14:placeholderFlag xmlns="" xmlns:ma14="http://schemas.microsoft.com/office/mac/drawingml/2011/main" val="1"/>
+              <ma14:placeholderFlag xmlns:ma14="http://schemas.microsoft.com/office/mac/drawingml/2011/main" xmlns="" val="1"/>
             </a:ext>
             <a:ext uri="{909E8E84-426E-40dd-AFC4-6F175D3DCCD1}">
-              <a14:hiddenFill xmlns:a14="http://schemas.microsoft.com/office/drawing/2010/main" xmlns="">
+              <a14:hiddenFill xmlns="" xmlns:a14="http://schemas.microsoft.com/office/drawing/2010/main">
                 <a:solidFill>
                   <a:srgbClr val="FFFFFF"/>
                 </a:solidFill>
               </a14:hiddenFill>
             </a:ext>
             <a:ext uri="{91240B29-F687-4f45-9708-019B960494DF}">
-              <a14:hiddenLine xmlns:a14="http://schemas.microsoft.com/office/drawing/2010/main" xmlns="" w="9525">
+              <a14:hiddenLine xmlns="" xmlns:a14="http://schemas.microsoft.com/office/drawing/2010/main" w="9525">
                 <a:solidFill>
                   <a:srgbClr val="000000"/>
                 </a:solidFill>
@@ -9749,6 +10132,52 @@
           </a:extLst>
         </p:spPr>
       </p:pic>
+      <p:sp>
+        <p:nvSpPr>
+          <p:cNvPr id="5" name="TextBox 4">
+            <a:extLst>
+              <a:ext uri="{FF2B5EF4-FFF2-40B4-BE49-F238E27FC236}">
+                <a16:creationId xmlns:a16="http://schemas.microsoft.com/office/drawing/2014/main" id="{427D8DCB-60C0-474D-934F-8DD8F28E73C0}"/>
+              </a:ext>
+            </a:extLst>
+          </p:cNvPr>
+          <p:cNvSpPr txBox="1"/>
+          <p:nvPr/>
+        </p:nvSpPr>
+        <p:spPr>
+          <a:xfrm>
+            <a:off x="6459687" y="351064"/>
+            <a:ext cx="1382110" cy="276999"/>
+          </a:xfrm>
+          <a:prstGeom prst="rect">
+            <a:avLst/>
+          </a:prstGeom>
+          <a:noFill/>
+        </p:spPr>
+        <p:txBody>
+          <a:bodyPr wrap="none" rtlCol="0">
+            <a:spAutoFit/>
+          </a:bodyPr>
+          <a:lstStyle/>
+          <a:p>
+            <a:r>
+              <a:rPr lang="en-US" sz="1200" dirty="0">
+                <a:solidFill>
+                  <a:schemeClr val="accent2"/>
+                </a:solidFill>
+                <a:latin typeface="Abadi Extra Light" panose="020B0604020202020204" pitchFamily="34" charset="0"/>
+              </a:rPr>
+              <a:t>Difficulty level: basic</a:t>
+            </a:r>
+            <a:endParaRPr lang="en-US" sz="1200" dirty="0">
+              <a:solidFill>
+                <a:schemeClr val="accent6"/>
+              </a:solidFill>
+              <a:latin typeface="Abadi Extra Light" panose="020B0604020202020204" pitchFamily="34" charset="0"/>
+            </a:endParaRPr>
+          </a:p>
+        </p:txBody>
+      </p:sp>
     </p:spTree>
   </p:cSld>
   <p:clrMapOvr>
@@ -9776,13 +10205,7 @@
       </p:grpSpPr>
       <p:sp>
         <p:nvSpPr>
-          <p:cNvPr id="6" name="Title 5">
-            <a:extLst>
-              <a:ext uri="{FF2B5EF4-FFF2-40B4-BE49-F238E27FC236}">
-                <a16:creationId xmlns:a16="http://schemas.microsoft.com/office/drawing/2014/main" id="{D84B1A30-EA14-476F-825C-A5D2A09B7980}"/>
-              </a:ext>
-            </a:extLst>
-          </p:cNvPr>
+          <p:cNvPr id="6" name="Title 5"/>
           <p:cNvSpPr>
             <a:spLocks noGrp="1"/>
           </p:cNvSpPr>
@@ -9797,144 +10220,46 @@
           <a:p>
             <a:r>
               <a:rPr lang="en-US" dirty="0"/>
-              <a:t>“Network Centrality”</a:t>
-            </a:r>
-          </a:p>
-        </p:txBody>
-      </p:sp>
-      <p:sp>
-        <p:nvSpPr>
-          <p:cNvPr id="7" name="Content Placeholder 6">
-            <a:extLst>
-              <a:ext uri="{FF2B5EF4-FFF2-40B4-BE49-F238E27FC236}">
-                <a16:creationId xmlns:a16="http://schemas.microsoft.com/office/drawing/2014/main" id="{F5080962-059D-4F48-B0CB-D71D92DFB6B6}"/>
-              </a:ext>
-            </a:extLst>
-          </p:cNvPr>
+              <a:t>A Brief Intro to Graph Analysis,</a:t>
+            </a:r>
+            <a:br>
+              <a:rPr lang="en-US" dirty="0"/>
+            </a:br>
+            <a:r>
+              <a:rPr lang="en-US" dirty="0"/>
+              <a:t>aka Network Science</a:t>
+            </a:r>
+          </a:p>
+        </p:txBody>
+      </p:sp>
+      <p:sp>
+        <p:nvSpPr>
+          <p:cNvPr id="8" name="Rectangle 3"/>
           <p:cNvSpPr>
-            <a:spLocks noGrp="1"/>
+            <a:spLocks noGrp="1" noChangeArrowheads="1"/>
           </p:cNvSpPr>
           <p:nvPr>
-            <p:ph idx="1"/>
+            <p:ph type="body" idx="1"/>
           </p:nvPr>
         </p:nvSpPr>
-        <p:spPr>
-          <a:xfrm>
-            <a:off x="698863" y="1144921"/>
-            <a:ext cx="8157007" cy="3762671"/>
-          </a:xfrm>
-        </p:spPr>
-        <p:txBody>
-          <a:bodyPr/>
+        <p:spPr/>
+        <p:txBody>
+          <a:bodyPr>
+            <a:normAutofit/>
+          </a:bodyPr>
           <a:lstStyle/>
           <a:p>
-            <a:pPr marL="0" indent="0">
-              <a:buNone/>
-            </a:pPr>
-            <a:r>
-              <a:rPr lang="en-US" dirty="0"/>
-              <a:t>The general question:</a:t>
-            </a:r>
-          </a:p>
-          <a:p>
-            <a:pPr marL="285750" lvl="1" indent="0">
-              <a:buNone/>
-            </a:pPr>
-            <a:r>
-              <a:rPr lang="en-US" dirty="0"/>
-              <a:t>How do we measure the </a:t>
-            </a:r>
-            <a:r>
-              <a:rPr lang="en-US" i="1" dirty="0"/>
-              <a:t>important</a:t>
-            </a:r>
-            <a:r>
-              <a:rPr lang="en-US" dirty="0"/>
-              <a:t> nodes in a graph?</a:t>
-            </a:r>
-          </a:p>
-          <a:p>
-            <a:pPr marL="285750" lvl="1" indent="0">
-              <a:buNone/>
-            </a:pPr>
-            <a:r>
-              <a:rPr lang="en-US" dirty="0"/>
-              <a:t>			aka the “central” nodes</a:t>
-            </a:r>
-          </a:p>
-          <a:p>
-            <a:pPr marL="285750" lvl="1" indent="0">
-              <a:buNone/>
-            </a:pPr>
-            <a:endParaRPr lang="en-US" dirty="0"/>
-          </a:p>
-          <a:p>
-            <a:pPr marL="0" indent="0">
-              <a:buNone/>
-            </a:pPr>
-            <a:r>
-              <a:rPr lang="en-US" dirty="0"/>
-              <a:t>Several methods proposed in network science literature:</a:t>
-            </a:r>
-          </a:p>
-          <a:p>
-            <a:pPr lvl="1"/>
-            <a:r>
-              <a:rPr lang="en-US" i="1" dirty="0"/>
-              <a:t>Degree centrality</a:t>
-            </a:r>
-            <a:r>
-              <a:rPr lang="en-US" dirty="0"/>
-              <a:t>: for a node, how many </a:t>
-            </a:r>
-            <a:r>
-              <a:rPr lang="en-US" b="1" dirty="0"/>
-              <a:t>other nodes is it connected to</a:t>
-            </a:r>
-            <a:endParaRPr lang="en-US" dirty="0"/>
-          </a:p>
-          <a:p>
-            <a:pPr lvl="1"/>
-            <a:r>
-              <a:rPr lang="en-US" i="1" dirty="0"/>
-              <a:t>Betweenness centrality</a:t>
-            </a:r>
-            <a:r>
-              <a:rPr lang="en-US" dirty="0"/>
-              <a:t>: for a node, how many </a:t>
-            </a:r>
-            <a:r>
-              <a:rPr lang="en-US" b="1" dirty="0"/>
-              <a:t>shortest paths</a:t>
-            </a:r>
-            <a:r>
-              <a:rPr lang="en-US" dirty="0"/>
-              <a:t> go through the node</a:t>
-            </a:r>
-          </a:p>
-          <a:p>
-            <a:pPr lvl="1"/>
-            <a:r>
-              <a:rPr lang="en-US" i="1" dirty="0"/>
-              <a:t>Eigenvector centrality</a:t>
-            </a:r>
-            <a:r>
-              <a:rPr lang="en-US" dirty="0"/>
-              <a:t>:  very similar to PageRank, which we’ll discuss shortly</a:t>
-            </a:r>
-            <a:endParaRPr lang="en-US" i="1" dirty="0"/>
-          </a:p>
-        </p:txBody>
-      </p:sp>
-      <p:sp>
-        <p:nvSpPr>
-          <p:cNvPr id="5" name="Slide Number Placeholder 4">
-            <a:extLst>
-              <a:ext uri="{FF2B5EF4-FFF2-40B4-BE49-F238E27FC236}">
-                <a16:creationId xmlns:a16="http://schemas.microsoft.com/office/drawing/2014/main" id="{C00F415D-9338-4C59-9CAC-825969693033}"/>
-              </a:ext>
-            </a:extLst>
-          </p:cNvPr>
+            <a:endParaRPr lang="en-US" altLang="en-US" dirty="0">
+              <a:solidFill>
+                <a:srgbClr val="800000"/>
+              </a:solidFill>
+            </a:endParaRPr>
+          </a:p>
+        </p:txBody>
+      </p:sp>
+      <p:sp>
+        <p:nvSpPr>
+          <p:cNvPr id="5" name="Slide Number Placeholder 4"/>
           <p:cNvSpPr>
             <a:spLocks noGrp="1"/>
           </p:cNvSpPr>
@@ -9947,14 +10272,9 @@
           <a:bodyPr/>
           <a:lstStyle/>
           <a:p>
-            <a:pPr>
-              <a:defRPr/>
-            </a:pPr>
-            <a:fld id="{B910DD2F-4B2A-1149-8114-29949C022244}" type="slidenum">
+            <a:fld id="{05072F42-4DFA-4725-86F9-7594E4AB4EB5}" type="slidenum">
               <a:rPr lang="en-GB" smtClean="0"/>
-              <a:pPr>
-                <a:defRPr/>
-              </a:pPr>
+              <a:pPr/>
               <a:t>10</a:t>
             </a:fld>
             <a:endParaRPr lang="en-GB"/>
@@ -9964,7 +10284,7 @@
     </p:spTree>
     <p:extLst>
       <p:ext uri="{BB962C8B-B14F-4D97-AF65-F5344CB8AC3E}">
-        <p14:creationId xmlns:p14="http://schemas.microsoft.com/office/powerpoint/2010/main" val="698893253"/>
+        <p14:creationId xmlns:p14="http://schemas.microsoft.com/office/powerpoint/2010/main" val="1265313350"/>
       </p:ext>
     </p:extLst>
   </p:cSld>
@@ -9993,10 +10313,10 @@
       </p:grpSpPr>
       <p:sp>
         <p:nvSpPr>
-          <p:cNvPr id="2" name="Title 1">
+          <p:cNvPr id="6" name="Title 5">
             <a:extLst>
               <a:ext uri="{FF2B5EF4-FFF2-40B4-BE49-F238E27FC236}">
-                <a16:creationId xmlns:a16="http://schemas.microsoft.com/office/drawing/2014/main" id="{39D7663A-BE66-4A77-A6C4-395521C31649}"/>
+                <a16:creationId xmlns:a16="http://schemas.microsoft.com/office/drawing/2014/main" id="{D84B1A30-EA14-476F-825C-A5D2A09B7980}"/>
               </a:ext>
             </a:extLst>
           </p:cNvPr>
@@ -10014,25 +10334,17 @@
           <a:p>
             <a:r>
               <a:rPr lang="en-US" dirty="0"/>
-              <a:t>Simplest Version: </a:t>
-            </a:r>
-            <a:r>
-              <a:rPr lang="en-US" i="1" dirty="0"/>
-              <a:t>Degree </a:t>
-            </a:r>
-            <a:r>
-              <a:rPr lang="en-US" dirty="0"/>
-              <a:t>Centrality</a:t>
-            </a:r>
-          </a:p>
-        </p:txBody>
-      </p:sp>
-      <p:sp>
-        <p:nvSpPr>
-          <p:cNvPr id="5" name="Content Placeholder 4">
+              <a:t>“Network Centrality”</a:t>
+            </a:r>
+          </a:p>
+        </p:txBody>
+      </p:sp>
+      <p:sp>
+        <p:nvSpPr>
+          <p:cNvPr id="7" name="Content Placeholder 6">
             <a:extLst>
               <a:ext uri="{FF2B5EF4-FFF2-40B4-BE49-F238E27FC236}">
-                <a16:creationId xmlns:a16="http://schemas.microsoft.com/office/drawing/2014/main" id="{95EFEF88-1EB6-4D41-8B2E-B75617CE59D0}"/>
+                <a16:creationId xmlns:a16="http://schemas.microsoft.com/office/drawing/2014/main" id="{F5080962-059D-4F48-B0CB-D71D92DFB6B6}"/>
               </a:ext>
             </a:extLst>
           </p:cNvPr>
@@ -10043,85 +10355,120 @@
             <p:ph idx="1"/>
           </p:nvPr>
         </p:nvSpPr>
-        <p:spPr/>
+        <p:spPr>
+          <a:xfrm>
+            <a:off x="698863" y="1144921"/>
+            <a:ext cx="8157007" cy="3762671"/>
+          </a:xfrm>
+        </p:spPr>
         <p:txBody>
           <a:bodyPr/>
           <a:lstStyle/>
           <a:p>
+            <a:pPr marL="0" indent="0">
+              <a:buNone/>
+            </a:pPr>
             <a:r>
               <a:rPr lang="en-US" dirty="0"/>
-              <a:t>For each node, compute its </a:t>
+              <a:t>The general question:</a:t>
+            </a:r>
+          </a:p>
+          <a:p>
+            <a:pPr marL="285750" lvl="1" indent="0">
+              <a:buNone/>
+            </a:pPr>
+            <a:r>
+              <a:rPr lang="en-US" dirty="0"/>
+              <a:t>How do we measure the </a:t>
+            </a:r>
+            <a:r>
+              <a:rPr lang="en-US" i="1" dirty="0"/>
+              <a:t>important</a:t>
+            </a:r>
+            <a:r>
+              <a:rPr lang="en-US" dirty="0"/>
+              <a:t> nodes in a graph?</a:t>
+            </a:r>
+          </a:p>
+          <a:p>
+            <a:pPr marL="285750" lvl="1" indent="0">
+              <a:buNone/>
+            </a:pPr>
+            <a:r>
+              <a:rPr lang="en-US" dirty="0"/>
+              <a:t>			aka the “central” nodes</a:t>
+            </a:r>
+          </a:p>
+          <a:p>
+            <a:pPr marL="285750" lvl="1" indent="0">
+              <a:buNone/>
+            </a:pPr>
+            <a:endParaRPr lang="en-US" dirty="0"/>
+          </a:p>
+          <a:p>
+            <a:pPr marL="0" indent="0">
+              <a:buNone/>
+            </a:pPr>
+            <a:r>
+              <a:rPr lang="en-US" dirty="0"/>
+              <a:t>Several methods proposed in network science literature:</a:t>
+            </a:r>
+          </a:p>
+          <a:p>
+            <a:pPr lvl="1"/>
+            <a:r>
+              <a:rPr lang="en-US" i="1" dirty="0"/>
+              <a:t>Degree centrality</a:t>
+            </a:r>
+            <a:r>
+              <a:rPr lang="en-US" dirty="0"/>
+              <a:t>: for a node, how many </a:t>
             </a:r>
             <a:r>
               <a:rPr lang="en-US" b="1" dirty="0"/>
-              <a:t>degree</a:t>
+              <a:t>other nodes is it connected to</a:t>
+            </a:r>
+            <a:endParaRPr lang="en-US" dirty="0"/>
+          </a:p>
+          <a:p>
+            <a:pPr lvl="1"/>
+            <a:r>
+              <a:rPr lang="en-US" i="1" dirty="0"/>
+              <a:t>Betweenness centrality</a:t>
             </a:r>
             <a:r>
               <a:rPr lang="en-US" dirty="0"/>
-              <a:t>, i.e., the number of edges it connects to</a:t>
-            </a:r>
-          </a:p>
-          <a:p>
-            <a:endParaRPr lang="en-US" dirty="0"/>
-          </a:p>
-          <a:p>
+              <a:t>: for a node, how many </a:t>
+            </a:r>
+            <a:r>
+              <a:rPr lang="en-US" b="1" dirty="0"/>
+              <a:t>shortest paths</a:t>
+            </a:r>
             <a:r>
               <a:rPr lang="en-US" dirty="0"/>
-              <a:t>In a </a:t>
-            </a:r>
-            <a:r>
-              <a:rPr lang="en-US" b="1" dirty="0"/>
-              <a:t>directed graph</a:t>
+              <a:t> go through the node</a:t>
+            </a:r>
+          </a:p>
+          <a:p>
+            <a:pPr lvl="1"/>
+            <a:r>
+              <a:rPr lang="en-US" i="1" dirty="0"/>
+              <a:t>Eigenvector centrality</a:t>
             </a:r>
             <a:r>
               <a:rPr lang="en-US" dirty="0"/>
-              <a:t> suppose we want </a:t>
-            </a:r>
-            <a:r>
-              <a:rPr lang="en-US" b="1" dirty="0"/>
-              <a:t>outdegree</a:t>
-            </a:r>
-            <a:r>
-              <a:rPr lang="en-US" dirty="0"/>
-              <a:t> centrality, i.e., the number of edges coming out from each node n</a:t>
-            </a:r>
-          </a:p>
-          <a:p>
-            <a:endParaRPr lang="en-US" dirty="0"/>
-          </a:p>
-          <a:p>
-            <a:endParaRPr lang="en-US" dirty="0"/>
-          </a:p>
-          <a:p>
-            <a:r>
-              <a:rPr lang="en-US" dirty="0"/>
-              <a:t>How to write in Pandas, given a </a:t>
-            </a:r>
-            <a:r>
-              <a:rPr lang="en-US" dirty="0" err="1"/>
-              <a:t>dataframe</a:t>
-            </a:r>
-            <a:r>
-              <a:rPr lang="en-US" dirty="0"/>
-              <a:t> </a:t>
-            </a:r>
-            <a:r>
-              <a:rPr lang="en-US" b="1" dirty="0"/>
-              <a:t>edges(from, to)</a:t>
-            </a:r>
-            <a:r>
-              <a:rPr lang="en-US" dirty="0"/>
-              <a:t>?</a:t>
-            </a:r>
-          </a:p>
-        </p:txBody>
-      </p:sp>
-      <p:sp>
-        <p:nvSpPr>
-          <p:cNvPr id="4" name="Slide Number Placeholder 3">
+              <a:t>:  very similar to PageRank, which we’ll discuss shortly</a:t>
+            </a:r>
+            <a:endParaRPr lang="en-US" i="1" dirty="0"/>
+          </a:p>
+        </p:txBody>
+      </p:sp>
+      <p:sp>
+        <p:nvSpPr>
+          <p:cNvPr id="5" name="Slide Number Placeholder 4">
             <a:extLst>
               <a:ext uri="{FF2B5EF4-FFF2-40B4-BE49-F238E27FC236}">
-                <a16:creationId xmlns:a16="http://schemas.microsoft.com/office/drawing/2014/main" id="{4FFFD890-E000-4474-B774-9AE97CA7BB8B}"/>
+                <a16:creationId xmlns:a16="http://schemas.microsoft.com/office/drawing/2014/main" id="{C00F415D-9338-4C59-9CAC-825969693033}"/>
               </a:ext>
             </a:extLst>
           </p:cNvPr>
@@ -10140,7 +10487,7 @@
             <a:pPr>
               <a:defRPr/>
             </a:pPr>
-            <a:fld id="{7511EA30-EE1A-224C-B1A5-D613D649D340}" type="slidenum">
+            <a:fld id="{B910DD2F-4B2A-1149-8114-29949C022244}" type="slidenum">
               <a:rPr lang="en-GB" smtClean="0"/>
               <a:pPr>
                 <a:defRPr/>
@@ -10154,7 +10501,7 @@
     </p:spTree>
     <p:extLst>
       <p:ext uri="{BB962C8B-B14F-4D97-AF65-F5344CB8AC3E}">
-        <p14:creationId xmlns:p14="http://schemas.microsoft.com/office/powerpoint/2010/main" val="2633395252"/>
+        <p14:creationId xmlns:p14="http://schemas.microsoft.com/office/powerpoint/2010/main" val="698893253"/>
       </p:ext>
     </p:extLst>
   </p:cSld>
@@ -10186,7 +10533,7 @@
           <p:cNvPr id="2" name="Title 1">
             <a:extLst>
               <a:ext uri="{FF2B5EF4-FFF2-40B4-BE49-F238E27FC236}">
-                <a16:creationId xmlns:a16="http://schemas.microsoft.com/office/drawing/2014/main" id="{DF3CE955-560A-4608-8423-13C340065F93}"/>
+                <a16:creationId xmlns:a16="http://schemas.microsoft.com/office/drawing/2014/main" id="{39D7663A-BE66-4A77-A6C4-395521C31649}"/>
               </a:ext>
             </a:extLst>
           </p:cNvPr>
@@ -10204,17 +10551,25 @@
           <a:p>
             <a:r>
               <a:rPr lang="en-US" dirty="0"/>
-              <a:t>Beyond Degree Centrality</a:t>
-            </a:r>
-          </a:p>
-        </p:txBody>
-      </p:sp>
-      <p:sp>
-        <p:nvSpPr>
-          <p:cNvPr id="3" name="Content Placeholder 2">
+              <a:t>Simplest Version: </a:t>
+            </a:r>
+            <a:r>
+              <a:rPr lang="en-US" i="1" dirty="0"/>
+              <a:t>Degree </a:t>
+            </a:r>
+            <a:r>
+              <a:rPr lang="en-US" dirty="0"/>
+              <a:t>Centrality</a:t>
+            </a:r>
+          </a:p>
+        </p:txBody>
+      </p:sp>
+      <p:sp>
+        <p:nvSpPr>
+          <p:cNvPr id="5" name="Content Placeholder 4">
             <a:extLst>
               <a:ext uri="{FF2B5EF4-FFF2-40B4-BE49-F238E27FC236}">
-                <a16:creationId xmlns:a16="http://schemas.microsoft.com/office/drawing/2014/main" id="{7DA0BD05-264B-4142-96CE-D6EDD2989F8B}"/>
+                <a16:creationId xmlns:a16="http://schemas.microsoft.com/office/drawing/2014/main" id="{95EFEF88-1EB6-4D41-8B2E-B75617CE59D0}"/>
               </a:ext>
             </a:extLst>
           </p:cNvPr>
@@ -10225,77 +10580,85 @@
             <p:ph idx="1"/>
           </p:nvPr>
         </p:nvSpPr>
-        <p:spPr>
-          <a:xfrm>
-            <a:off x="493496" y="1249493"/>
-            <a:ext cx="8157007" cy="3762671"/>
-          </a:xfrm>
-        </p:spPr>
+        <p:spPr/>
         <p:txBody>
           <a:bodyPr/>
           <a:lstStyle/>
           <a:p>
             <a:r>
               <a:rPr lang="en-US" dirty="0"/>
-              <a:t>Degree centrality is </a:t>
-            </a:r>
-            <a:r>
-              <a:rPr lang="en-US" i="1" dirty="0"/>
-              <a:t>moderately</a:t>
+              <a:t>For each node, compute its </a:t>
+            </a:r>
+            <a:r>
+              <a:rPr lang="en-US" b="1" dirty="0"/>
+              <a:t>degree</a:t>
             </a:r>
             <a:r>
               <a:rPr lang="en-US" dirty="0"/>
-              <a:t> useful</a:t>
-            </a:r>
-          </a:p>
-          <a:p>
-            <a:pPr lvl="1"/>
+              <a:t>, i.e., the number of edges it connects to</a:t>
+            </a:r>
+          </a:p>
+          <a:p>
+            <a:endParaRPr lang="en-US" dirty="0"/>
+          </a:p>
+          <a:p>
             <a:r>
               <a:rPr lang="en-US" dirty="0"/>
-              <a:t>citation counts in academia</a:t>
-            </a:r>
-          </a:p>
-          <a:p>
-            <a:pPr lvl="1"/>
+              <a:t>In a </a:t>
+            </a:r>
+            <a:r>
+              <a:rPr lang="en-US" b="1" dirty="0"/>
+              <a:t>directed graph</a:t>
+            </a:r>
             <a:r>
               <a:rPr lang="en-US" dirty="0"/>
-              <a:t>number of followers in Twitter</a:t>
-            </a:r>
-          </a:p>
-          <a:p>
-            <a:pPr lvl="1"/>
+              <a:t> suppose we want </a:t>
+            </a:r>
+            <a:r>
+              <a:rPr lang="en-US" b="1" dirty="0"/>
+              <a:t>outdegree</a:t>
+            </a:r>
             <a:r>
               <a:rPr lang="en-US" dirty="0"/>
-              <a:t>number of commits in GitHub</a:t>
-            </a:r>
-          </a:p>
-          <a:p>
-            <a:pPr lvl="1"/>
+              <a:t> centrality, i.e., the number of edges coming out from each node n</a:t>
+            </a:r>
+          </a:p>
+          <a:p>
             <a:endParaRPr lang="en-US" dirty="0"/>
           </a:p>
           <a:p>
+            <a:endParaRPr lang="en-US" dirty="0"/>
+          </a:p>
+          <a:p>
             <a:r>
               <a:rPr lang="en-US" dirty="0"/>
-              <a:t>But we may want to look at relationships to more distant nodes!</a:t>
-            </a:r>
-          </a:p>
-          <a:p>
-            <a:endParaRPr lang="en-US" dirty="0"/>
-          </a:p>
-          <a:p>
+              <a:t>How to write in Pandas, given a </a:t>
+            </a:r>
+            <a:r>
+              <a:rPr lang="en-US" dirty="0" err="1"/>
+              <a:t>dataframe</a:t>
+            </a:r>
             <a:r>
               <a:rPr lang="en-US" dirty="0"/>
-              <a:t>To get there, let’s look at how to reason about what’s nearby in a graph</a:t>
-            </a:r>
-          </a:p>
-        </p:txBody>
-      </p:sp>
-      <p:sp>
-        <p:nvSpPr>
-          <p:cNvPr id="5" name="Slide Number Placeholder 4">
+              <a:t> </a:t>
+            </a:r>
+            <a:r>
+              <a:rPr lang="en-US" b="1" dirty="0"/>
+              <a:t>edges(from, to)</a:t>
+            </a:r>
+            <a:r>
+              <a:rPr lang="en-US" dirty="0"/>
+              <a:t>?</a:t>
+            </a:r>
+          </a:p>
+        </p:txBody>
+      </p:sp>
+      <p:sp>
+        <p:nvSpPr>
+          <p:cNvPr id="4" name="Slide Number Placeholder 3">
             <a:extLst>
               <a:ext uri="{FF2B5EF4-FFF2-40B4-BE49-F238E27FC236}">
-                <a16:creationId xmlns:a16="http://schemas.microsoft.com/office/drawing/2014/main" id="{639AC589-6B3C-4592-A2FD-8DDABB2EE14E}"/>
+                <a16:creationId xmlns:a16="http://schemas.microsoft.com/office/drawing/2014/main" id="{4FFFD890-E000-4474-B774-9AE97CA7BB8B}"/>
               </a:ext>
             </a:extLst>
           </p:cNvPr>
@@ -10314,7 +10677,7 @@
             <a:pPr>
               <a:defRPr/>
             </a:pPr>
-            <a:fld id="{B5D931A1-A42B-F94C-ADA3-91D74B0ACBA8}" type="slidenum">
+            <a:fld id="{7511EA30-EE1A-224C-B1A5-D613D649D340}" type="slidenum">
               <a:rPr lang="en-GB" smtClean="0"/>
               <a:pPr>
                 <a:defRPr/>
@@ -10328,7 +10691,7 @@
     </p:spTree>
     <p:extLst>
       <p:ext uri="{BB962C8B-B14F-4D97-AF65-F5344CB8AC3E}">
-        <p14:creationId xmlns:p14="http://schemas.microsoft.com/office/powerpoint/2010/main" val="3215212446"/>
+        <p14:creationId xmlns:p14="http://schemas.microsoft.com/office/powerpoint/2010/main" val="2633395252"/>
       </p:ext>
     </p:extLst>
   </p:cSld>
@@ -10357,7 +10720,13 @@
       </p:grpSpPr>
       <p:sp>
         <p:nvSpPr>
-          <p:cNvPr id="2" name="Title 1"/>
+          <p:cNvPr id="2" name="Title 1">
+            <a:extLst>
+              <a:ext uri="{FF2B5EF4-FFF2-40B4-BE49-F238E27FC236}">
+                <a16:creationId xmlns:a16="http://schemas.microsoft.com/office/drawing/2014/main" id="{DF3CE955-560A-4608-8423-13C340065F93}"/>
+              </a:ext>
+            </a:extLst>
+          </p:cNvPr>
           <p:cNvSpPr>
             <a:spLocks noGrp="1"/>
           </p:cNvSpPr>
@@ -10372,14 +10741,20 @@
           <a:p>
             <a:r>
               <a:rPr lang="en-US" dirty="0"/>
-              <a:t>Exploring a Graph</a:t>
-            </a:r>
-          </a:p>
-        </p:txBody>
-      </p:sp>
-      <p:sp>
-        <p:nvSpPr>
-          <p:cNvPr id="4" name="Content Placeholder 3"/>
+              <a:t>Beyond Degree Centrality</a:t>
+            </a:r>
+          </a:p>
+        </p:txBody>
+      </p:sp>
+      <p:sp>
+        <p:nvSpPr>
+          <p:cNvPr id="3" name="Content Placeholder 2">
+            <a:extLst>
+              <a:ext uri="{FF2B5EF4-FFF2-40B4-BE49-F238E27FC236}">
+                <a16:creationId xmlns:a16="http://schemas.microsoft.com/office/drawing/2014/main" id="{7DA0BD05-264B-4142-96CE-D6EDD2989F8B}"/>
+              </a:ext>
+            </a:extLst>
+          </p:cNvPr>
           <p:cNvSpPr>
             <a:spLocks noGrp="1"/>
           </p:cNvSpPr>
@@ -10387,79 +10762,80 @@
             <p:ph idx="1"/>
           </p:nvPr>
         </p:nvSpPr>
-        <p:spPr/>
-        <p:txBody>
-          <a:bodyPr>
-            <a:normAutofit/>
-          </a:bodyPr>
+        <p:spPr>
+          <a:xfrm>
+            <a:off x="493496" y="1249493"/>
+            <a:ext cx="8157007" cy="3762671"/>
+          </a:xfrm>
+        </p:spPr>
+        <p:txBody>
+          <a:bodyPr/>
           <a:lstStyle/>
           <a:p>
-            <a:pPr marL="0" indent="0">
-              <a:buNone/>
-            </a:pPr>
-            <a:r>
-              <a:rPr lang="en-US" sz="2000" dirty="0"/>
-              <a:t>We will want to start at some node (set) and look at connected nodes in the graph</a:t>
+            <a:r>
+              <a:rPr lang="en-US" dirty="0"/>
+              <a:t>Degree centrality is </a:t>
+            </a:r>
+            <a:r>
+              <a:rPr lang="en-US" i="1" dirty="0"/>
+              <a:t>moderately</a:t>
+            </a:r>
+            <a:r>
+              <a:rPr lang="en-US" dirty="0"/>
+              <a:t> useful</a:t>
             </a:r>
           </a:p>
           <a:p>
             <a:pPr lvl="1"/>
             <a:r>
-              <a:rPr lang="en-US" sz="1800" dirty="0"/>
-              <a:t>How far away is X from Y?</a:t>
+              <a:rPr lang="en-US" dirty="0"/>
+              <a:t>citation counts in academia</a:t>
             </a:r>
           </a:p>
           <a:p>
             <a:pPr lvl="1"/>
             <a:r>
-              <a:rPr lang="en-US" sz="1800" dirty="0"/>
-              <a:t>How many nodes are within distance </a:t>
-            </a:r>
-            <a:r>
-              <a:rPr lang="en-US" sz="1800" i="1" dirty="0"/>
-              <a:t>k</a:t>
-            </a:r>
-            <a:r>
-              <a:rPr lang="en-US" sz="1800" dirty="0"/>
-              <a:t>?</a:t>
+              <a:rPr lang="en-US" dirty="0"/>
+              <a:t>number of followers in Twitter</a:t>
             </a:r>
           </a:p>
           <a:p>
             <a:pPr lvl="1"/>
             <a:r>
-              <a:rPr lang="en-US" sz="1800" dirty="0"/>
-              <a:t>What are the odds I can start at X and end up at Y?</a:t>
+              <a:rPr lang="en-US" dirty="0"/>
+              <a:t>number of commits in GitHub</a:t>
             </a:r>
           </a:p>
           <a:p>
             <a:pPr lvl="1"/>
-            <a:endParaRPr lang="en-US" sz="1800" dirty="0"/>
-          </a:p>
-          <a:p>
-            <a:pPr lvl="1"/>
-            <a:r>
-              <a:rPr lang="en-US" sz="1800" dirty="0"/>
-              <a:t>(Some of these are the basis of ranking + recommendations)</a:t>
-            </a:r>
-          </a:p>
-          <a:p>
-            <a:pPr lvl="1"/>
-            <a:endParaRPr lang="en-US" sz="1800" dirty="0"/>
-          </a:p>
-          <a:p>
-            <a:pPr marL="0" indent="0">
-              <a:buNone/>
-            </a:pPr>
-            <a:r>
-              <a:rPr lang="en-US" sz="2000" dirty="0"/>
-              <a:t>So how can we do this?</a:t>
-            </a:r>
-          </a:p>
-        </p:txBody>
-      </p:sp>
-      <p:sp>
-        <p:nvSpPr>
-          <p:cNvPr id="3" name="Slide Number Placeholder 2"/>
+            <a:endParaRPr lang="en-US" dirty="0"/>
+          </a:p>
+          <a:p>
+            <a:r>
+              <a:rPr lang="en-US" dirty="0"/>
+              <a:t>But we may want to look at relationships to more distant nodes!</a:t>
+            </a:r>
+          </a:p>
+          <a:p>
+            <a:endParaRPr lang="en-US" dirty="0"/>
+          </a:p>
+          <a:p>
+            <a:r>
+              <a:rPr lang="en-US" dirty="0"/>
+              <a:t>To get there, let’s look at how to reason about what’s nearby in a graph</a:t>
+            </a:r>
+          </a:p>
+        </p:txBody>
+      </p:sp>
+      <p:sp>
+        <p:nvSpPr>
+          <p:cNvPr id="5" name="Slide Number Placeholder 4">
+            <a:extLst>
+              <a:ext uri="{FF2B5EF4-FFF2-40B4-BE49-F238E27FC236}">
+                <a16:creationId xmlns:a16="http://schemas.microsoft.com/office/drawing/2014/main" id="{639AC589-6B3C-4592-A2FD-8DDABB2EE14E}"/>
+              </a:ext>
+            </a:extLst>
+          </p:cNvPr>
           <p:cNvSpPr>
             <a:spLocks noGrp="1"/>
           </p:cNvSpPr>
@@ -10475,21 +10851,21 @@
             <a:pPr>
               <a:defRPr/>
             </a:pPr>
-            <a:fld id="{CC8026B7-16C5-45AC-A8B3-C65D7B841B57}" type="slidenum">
-              <a:rPr lang="en-US" smtClean="0"/>
+            <a:fld id="{B5D931A1-A42B-F94C-ADA3-91D74B0ACBA8}" type="slidenum">
+              <a:rPr lang="en-GB" smtClean="0"/>
               <a:pPr>
                 <a:defRPr/>
               </a:pPr>
               <a:t>13</a:t>
             </a:fld>
-            <a:endParaRPr lang="en-US"/>
+            <a:endParaRPr lang="en-GB"/>
           </a:p>
         </p:txBody>
       </p:sp>
     </p:spTree>
     <p:extLst>
       <p:ext uri="{BB962C8B-B14F-4D97-AF65-F5344CB8AC3E}">
-        <p14:creationId xmlns:p14="http://schemas.microsoft.com/office/powerpoint/2010/main" val="1462122400"/>
+        <p14:creationId xmlns:p14="http://schemas.microsoft.com/office/powerpoint/2010/main" val="3215212446"/>
       </p:ext>
     </p:extLst>
   </p:cSld>
@@ -10518,6 +10894,167 @@
       </p:grpSpPr>
       <p:sp>
         <p:nvSpPr>
+          <p:cNvPr id="2" name="Title 1"/>
+          <p:cNvSpPr>
+            <a:spLocks noGrp="1"/>
+          </p:cNvSpPr>
+          <p:nvPr>
+            <p:ph type="title"/>
+          </p:nvPr>
+        </p:nvSpPr>
+        <p:spPr/>
+        <p:txBody>
+          <a:bodyPr/>
+          <a:lstStyle/>
+          <a:p>
+            <a:r>
+              <a:rPr lang="en-US" dirty="0"/>
+              <a:t>Exploring a Graph</a:t>
+            </a:r>
+          </a:p>
+        </p:txBody>
+      </p:sp>
+      <p:sp>
+        <p:nvSpPr>
+          <p:cNvPr id="4" name="Content Placeholder 3"/>
+          <p:cNvSpPr>
+            <a:spLocks noGrp="1"/>
+          </p:cNvSpPr>
+          <p:nvPr>
+            <p:ph idx="1"/>
+          </p:nvPr>
+        </p:nvSpPr>
+        <p:spPr/>
+        <p:txBody>
+          <a:bodyPr>
+            <a:normAutofit/>
+          </a:bodyPr>
+          <a:lstStyle/>
+          <a:p>
+            <a:pPr marL="0" indent="0">
+              <a:buNone/>
+            </a:pPr>
+            <a:r>
+              <a:rPr lang="en-US" sz="2000" dirty="0"/>
+              <a:t>We will want to start at some node (set) and look at connected nodes in the graph</a:t>
+            </a:r>
+          </a:p>
+          <a:p>
+            <a:pPr lvl="1"/>
+            <a:r>
+              <a:rPr lang="en-US" sz="1800" dirty="0"/>
+              <a:t>How far away is X from Y?</a:t>
+            </a:r>
+          </a:p>
+          <a:p>
+            <a:pPr lvl="1"/>
+            <a:r>
+              <a:rPr lang="en-US" sz="1800" dirty="0"/>
+              <a:t>How many nodes are within distance </a:t>
+            </a:r>
+            <a:r>
+              <a:rPr lang="en-US" sz="1800" i="1" dirty="0"/>
+              <a:t>k</a:t>
+            </a:r>
+            <a:r>
+              <a:rPr lang="en-US" sz="1800" dirty="0"/>
+              <a:t>?</a:t>
+            </a:r>
+          </a:p>
+          <a:p>
+            <a:pPr lvl="1"/>
+            <a:r>
+              <a:rPr lang="en-US" sz="1800" dirty="0"/>
+              <a:t>What are the odds I can start at X and end up at Y?</a:t>
+            </a:r>
+          </a:p>
+          <a:p>
+            <a:pPr lvl="1"/>
+            <a:endParaRPr lang="en-US" sz="1800" dirty="0"/>
+          </a:p>
+          <a:p>
+            <a:pPr lvl="1"/>
+            <a:r>
+              <a:rPr lang="en-US" sz="1800" dirty="0"/>
+              <a:t>(Some of these are the basis of ranking + recommendations)</a:t>
+            </a:r>
+          </a:p>
+          <a:p>
+            <a:pPr lvl="1"/>
+            <a:endParaRPr lang="en-US" sz="1800" dirty="0"/>
+          </a:p>
+          <a:p>
+            <a:pPr marL="0" indent="0">
+              <a:buNone/>
+            </a:pPr>
+            <a:r>
+              <a:rPr lang="en-US" sz="2000" dirty="0"/>
+              <a:t>So how can we do this?</a:t>
+            </a:r>
+          </a:p>
+        </p:txBody>
+      </p:sp>
+      <p:sp>
+        <p:nvSpPr>
+          <p:cNvPr id="3" name="Slide Number Placeholder 2"/>
+          <p:cNvSpPr>
+            <a:spLocks noGrp="1"/>
+          </p:cNvSpPr>
+          <p:nvPr>
+            <p:ph type="sldNum" sz="quarter" idx="12"/>
+          </p:nvPr>
+        </p:nvSpPr>
+        <p:spPr/>
+        <p:txBody>
+          <a:bodyPr/>
+          <a:lstStyle/>
+          <a:p>
+            <a:pPr>
+              <a:defRPr/>
+            </a:pPr>
+            <a:fld id="{CC8026B7-16C5-45AC-A8B3-C65D7B841B57}" type="slidenum">
+              <a:rPr lang="en-US" smtClean="0"/>
+              <a:pPr>
+                <a:defRPr/>
+              </a:pPr>
+              <a:t>14</a:t>
+            </a:fld>
+            <a:endParaRPr lang="en-US"/>
+          </a:p>
+        </p:txBody>
+      </p:sp>
+    </p:spTree>
+    <p:extLst>
+      <p:ext uri="{BB962C8B-B14F-4D97-AF65-F5344CB8AC3E}">
+        <p14:creationId xmlns:p14="http://schemas.microsoft.com/office/powerpoint/2010/main" val="1462122400"/>
+      </p:ext>
+    </p:extLst>
+  </p:cSld>
+  <p:clrMapOvr>
+    <a:masterClrMapping/>
+  </p:clrMapOvr>
+</p:sld>
+</file>
+
+<file path=ppt/slides/slide15.xml><?xml version="1.0" encoding="utf-8"?>
+<p:sld xmlns:a="http://schemas.openxmlformats.org/drawingml/2006/main" xmlns:r="http://schemas.openxmlformats.org/officeDocument/2006/relationships" xmlns:p="http://schemas.openxmlformats.org/presentationml/2006/main">
+  <p:cSld>
+    <p:spTree>
+      <p:nvGrpSpPr>
+        <p:cNvPr id="1" name=""/>
+        <p:cNvGrpSpPr/>
+        <p:nvPr/>
+      </p:nvGrpSpPr>
+      <p:grpSpPr>
+        <a:xfrm>
+          <a:off x="0" y="0"/>
+          <a:ext cx="0" cy="0"/>
+          <a:chOff x="0" y="0"/>
+          <a:chExt cx="0" cy="0"/>
+        </a:xfrm>
+      </p:grpSpPr>
+      <p:sp>
+        <p:nvSpPr>
           <p:cNvPr id="60419" name="Rectangle 3"/>
           <p:cNvSpPr>
             <a:spLocks noGrp="1"/>
@@ -10813,7 +11350,7 @@
 </p:sld>
 </file>
 
-<file path=ppt/slides/slide15.xml><?xml version="1.0" encoding="utf-8"?>
+<file path=ppt/slides/slide16.xml><?xml version="1.0" encoding="utf-8"?>
 <p:sld xmlns:a="http://schemas.openxmlformats.org/drawingml/2006/main" xmlns:r="http://schemas.openxmlformats.org/officeDocument/2006/relationships" xmlns:p="http://schemas.openxmlformats.org/presentationml/2006/main">
   <p:cSld>
     <p:spTree>
@@ -12472,397 +13009,6 @@
 </p:sld>
 </file>
 
-<file path=ppt/slides/slide16.xml><?xml version="1.0" encoding="utf-8"?>
-<p:sld xmlns:a="http://schemas.openxmlformats.org/drawingml/2006/main" xmlns:r="http://schemas.openxmlformats.org/officeDocument/2006/relationships" xmlns:p="http://schemas.openxmlformats.org/presentationml/2006/main">
-  <p:cSld>
-    <p:spTree>
-      <p:nvGrpSpPr>
-        <p:cNvPr id="1" name=""/>
-        <p:cNvGrpSpPr/>
-        <p:nvPr/>
-      </p:nvGrpSpPr>
-      <p:grpSpPr>
-        <a:xfrm>
-          <a:off x="0" y="0"/>
-          <a:ext cx="0" cy="0"/>
-          <a:chOff x="0" y="0"/>
-          <a:chExt cx="0" cy="0"/>
-        </a:xfrm>
-      </p:grpSpPr>
-      <p:sp>
-        <p:nvSpPr>
-          <p:cNvPr id="2" name="Title 1"/>
-          <p:cNvSpPr>
-            <a:spLocks noGrp="1"/>
-          </p:cNvSpPr>
-          <p:nvPr>
-            <p:ph type="title"/>
-          </p:nvPr>
-        </p:nvSpPr>
-        <p:spPr/>
-        <p:txBody>
-          <a:bodyPr/>
-          <a:lstStyle/>
-          <a:p>
-            <a:r>
-              <a:rPr lang="en-US" dirty="0"/>
-              <a:t>BFS – Centralized, Loop-Based Algorithm</a:t>
-            </a:r>
-          </a:p>
-        </p:txBody>
-      </p:sp>
-      <p:sp>
-        <p:nvSpPr>
-          <p:cNvPr id="3" name="TextBox 2"/>
-          <p:cNvSpPr txBox="1"/>
-          <p:nvPr/>
-        </p:nvSpPr>
-        <p:spPr>
-          <a:xfrm>
-            <a:off x="1401473" y="1091862"/>
-            <a:ext cx="5609228" cy="1200329"/>
-          </a:xfrm>
-          <a:prstGeom prst="rect">
-            <a:avLst/>
-          </a:prstGeom>
-          <a:noFill/>
-          <a:ln>
-            <a:solidFill>
-              <a:schemeClr val="tx1"/>
-            </a:solidFill>
-          </a:ln>
-        </p:spPr>
-        <p:txBody>
-          <a:bodyPr wrap="none" rtlCol="0">
-            <a:spAutoFit/>
-          </a:bodyPr>
-          <a:lstStyle/>
-          <a:p>
-            <a:pPr algn="l"/>
-            <a:r>
-              <a:rPr lang="en-US" sz="1800" dirty="0">
-                <a:solidFill>
-                  <a:schemeClr val="accent3"/>
-                </a:solidFill>
-                <a:latin typeface="Helvetica" panose="020B0604020202020204" pitchFamily="34" charset="0"/>
-                <a:ea typeface="Constantia" charset="0"/>
-                <a:cs typeface="Helvetica" panose="020B0604020202020204" pitchFamily="34" charset="0"/>
-              </a:rPr>
-              <a:t>Initialize a </a:t>
-            </a:r>
-            <a:r>
-              <a:rPr lang="en-US" sz="1800" b="1" dirty="0">
-                <a:solidFill>
-                  <a:schemeClr val="accent3"/>
-                </a:solidFill>
-                <a:latin typeface="Helvetica" panose="020B0604020202020204" pitchFamily="34" charset="0"/>
-                <a:ea typeface="Constantia" charset="0"/>
-                <a:cs typeface="Helvetica" panose="020B0604020202020204" pitchFamily="34" charset="0"/>
-              </a:rPr>
-              <a:t>frontier queue</a:t>
-            </a:r>
-            <a:r>
-              <a:rPr lang="en-US" sz="1800" dirty="0">
-                <a:solidFill>
-                  <a:schemeClr val="accent3"/>
-                </a:solidFill>
-                <a:latin typeface="Helvetica" panose="020B0604020202020204" pitchFamily="34" charset="0"/>
-                <a:ea typeface="Constantia" charset="0"/>
-                <a:cs typeface="Helvetica" panose="020B0604020202020204" pitchFamily="34" charset="0"/>
-              </a:rPr>
-              <a:t> with the origin node</a:t>
-            </a:r>
-          </a:p>
-          <a:p>
-            <a:pPr algn="l"/>
-            <a:r>
-              <a:rPr lang="en-US" sz="1800" dirty="0">
-                <a:solidFill>
-                  <a:schemeClr val="accent3"/>
-                </a:solidFill>
-                <a:latin typeface="Helvetica" panose="020B0604020202020204" pitchFamily="34" charset="0"/>
-                <a:ea typeface="Constantia" charset="0"/>
-                <a:cs typeface="Helvetica" panose="020B0604020202020204" pitchFamily="34" charset="0"/>
-              </a:rPr>
-              <a:t>While the </a:t>
-            </a:r>
-            <a:r>
-              <a:rPr lang="en-US" sz="1800" b="1" dirty="0">
-                <a:solidFill>
-                  <a:schemeClr val="accent3"/>
-                </a:solidFill>
-                <a:latin typeface="Helvetica" panose="020B0604020202020204" pitchFamily="34" charset="0"/>
-                <a:ea typeface="Constantia" charset="0"/>
-                <a:cs typeface="Helvetica" panose="020B0604020202020204" pitchFamily="34" charset="0"/>
-              </a:rPr>
-              <a:t>frontier queue</a:t>
-            </a:r>
-            <a:r>
-              <a:rPr lang="en-US" sz="1800" dirty="0">
-                <a:solidFill>
-                  <a:schemeClr val="accent3"/>
-                </a:solidFill>
-                <a:latin typeface="Helvetica" panose="020B0604020202020204" pitchFamily="34" charset="0"/>
-                <a:ea typeface="Constantia" charset="0"/>
-                <a:cs typeface="Helvetica" panose="020B0604020202020204" pitchFamily="34" charset="0"/>
-              </a:rPr>
-              <a:t> has a vertex in it</a:t>
-            </a:r>
-          </a:p>
-          <a:p>
-            <a:pPr algn="l"/>
-            <a:r>
-              <a:rPr lang="en-US" sz="1800" dirty="0">
-                <a:solidFill>
-                  <a:schemeClr val="accent3"/>
-                </a:solidFill>
-                <a:latin typeface="Helvetica" panose="020B0604020202020204" pitchFamily="34" charset="0"/>
-                <a:ea typeface="Constantia" charset="0"/>
-                <a:cs typeface="Helvetica" panose="020B0604020202020204" pitchFamily="34" charset="0"/>
-              </a:rPr>
-              <a:t>	Pick a vertex </a:t>
-            </a:r>
-            <a:r>
-              <a:rPr lang="en-US" sz="1800" b="1" dirty="0" err="1">
-                <a:solidFill>
-                  <a:schemeClr val="accent3"/>
-                </a:solidFill>
-                <a:latin typeface="Helvetica" panose="020B0604020202020204" pitchFamily="34" charset="0"/>
-                <a:ea typeface="Constantia" charset="0"/>
-                <a:cs typeface="Helvetica" panose="020B0604020202020204" pitchFamily="34" charset="0"/>
-              </a:rPr>
-              <a:t>v</a:t>
-            </a:r>
-            <a:r>
-              <a:rPr lang="en-US" sz="1800" dirty="0">
-                <a:solidFill>
-                  <a:schemeClr val="accent3"/>
-                </a:solidFill>
-                <a:latin typeface="Helvetica" panose="020B0604020202020204" pitchFamily="34" charset="0"/>
-                <a:ea typeface="Constantia" charset="0"/>
-                <a:cs typeface="Helvetica" panose="020B0604020202020204" pitchFamily="34" charset="0"/>
-              </a:rPr>
-              <a:t> from the front of the queue</a:t>
-            </a:r>
-          </a:p>
-          <a:p>
-            <a:pPr algn="l"/>
-            <a:r>
-              <a:rPr lang="en-US" sz="1800" dirty="0">
-                <a:solidFill>
-                  <a:schemeClr val="accent3"/>
-                </a:solidFill>
-                <a:latin typeface="Helvetica" panose="020B0604020202020204" pitchFamily="34" charset="0"/>
-                <a:ea typeface="Constantia" charset="0"/>
-                <a:cs typeface="Helvetica" panose="020B0604020202020204" pitchFamily="34" charset="0"/>
-              </a:rPr>
-              <a:t>	Put each unexplored neighbor of v in </a:t>
-            </a:r>
-            <a:r>
-              <a:rPr lang="en-US" sz="1800" b="1" dirty="0">
-                <a:solidFill>
-                  <a:schemeClr val="accent3"/>
-                </a:solidFill>
-                <a:latin typeface="Helvetica" panose="020B0604020202020204" pitchFamily="34" charset="0"/>
-                <a:ea typeface="Constantia" charset="0"/>
-                <a:cs typeface="Helvetica" panose="020B0604020202020204" pitchFamily="34" charset="0"/>
-              </a:rPr>
-              <a:t>queue</a:t>
-            </a:r>
-          </a:p>
-        </p:txBody>
-      </p:sp>
-      <p:sp>
-        <p:nvSpPr>
-          <p:cNvPr id="5" name="TextBox 4"/>
-          <p:cNvSpPr txBox="1"/>
-          <p:nvPr/>
-        </p:nvSpPr>
-        <p:spPr>
-          <a:xfrm>
-            <a:off x="1069711" y="2637766"/>
-            <a:ext cx="7400424" cy="2862322"/>
-          </a:xfrm>
-          <a:prstGeom prst="rect">
-            <a:avLst/>
-          </a:prstGeom>
-          <a:noFill/>
-        </p:spPr>
-        <p:txBody>
-          <a:bodyPr wrap="none" rtlCol="0">
-            <a:spAutoFit/>
-          </a:bodyPr>
-          <a:lstStyle/>
-          <a:p>
-            <a:r>
-              <a:rPr lang="en-US" sz="1800" i="1" dirty="0">
-                <a:latin typeface="Helvetica" panose="020B0604020202020204" pitchFamily="34" charset="0"/>
-                <a:ea typeface="Constantia" charset="0"/>
-                <a:cs typeface="Helvetica" panose="020B0604020202020204" pitchFamily="34" charset="0"/>
-              </a:rPr>
-              <a:t>Note closer edges are always considered before more distant edges. </a:t>
-            </a:r>
-          </a:p>
-          <a:p>
-            <a:endParaRPr lang="en-US" sz="1800" i="1" dirty="0">
-              <a:latin typeface="Helvetica" panose="020B0604020202020204" pitchFamily="34" charset="0"/>
-              <a:ea typeface="Constantia" charset="0"/>
-              <a:cs typeface="Helvetica" panose="020B0604020202020204" pitchFamily="34" charset="0"/>
-            </a:endParaRPr>
-          </a:p>
-          <a:p>
-            <a:r>
-              <a:rPr lang="en-US" sz="1800" dirty="0">
-                <a:solidFill>
-                  <a:srgbClr val="9C5238"/>
-                </a:solidFill>
-                <a:latin typeface="Helvetica" panose="020B0604020202020204" pitchFamily="34" charset="0"/>
-                <a:ea typeface="Constantia" charset="0"/>
-                <a:cs typeface="Helvetica" panose="020B0604020202020204" pitchFamily="34" charset="0"/>
-              </a:rPr>
-              <a:t>Efficiency: </a:t>
-            </a:r>
-            <a:r>
-              <a:rPr lang="en-US" sz="1800" dirty="0">
-                <a:latin typeface="Helvetica" panose="020B0604020202020204" pitchFamily="34" charset="0"/>
-                <a:ea typeface="Constantia" charset="0"/>
-                <a:cs typeface="Helvetica" panose="020B0604020202020204" pitchFamily="34" charset="0"/>
-              </a:rPr>
-              <a:t>Each edge is examined </a:t>
-            </a:r>
-            <a:r>
-              <a:rPr lang="en-US" sz="1800" b="1" dirty="0">
-                <a:latin typeface="Helvetica" panose="020B0604020202020204" pitchFamily="34" charset="0"/>
-                <a:ea typeface="Constantia" charset="0"/>
-                <a:cs typeface="Helvetica" panose="020B0604020202020204" pitchFamily="34" charset="0"/>
-              </a:rPr>
-              <a:t>once</a:t>
-            </a:r>
-            <a:r>
-              <a:rPr lang="en-US" sz="1800" dirty="0">
-                <a:latin typeface="Helvetica" panose="020B0604020202020204" pitchFamily="34" charset="0"/>
-                <a:ea typeface="Constantia" charset="0"/>
-                <a:cs typeface="Helvetica" panose="020B0604020202020204" pitchFamily="34" charset="0"/>
-              </a:rPr>
-              <a:t> (</a:t>
-            </a:r>
-            <a:r>
-              <a:rPr lang="en-US" sz="1800" i="1" dirty="0">
-                <a:latin typeface="Helvetica" panose="020B0604020202020204" pitchFamily="34" charset="0"/>
-                <a:ea typeface="Constantia" charset="0"/>
-                <a:cs typeface="Helvetica" panose="020B0604020202020204" pitchFamily="34" charset="0"/>
-              </a:rPr>
-              <a:t>undirected</a:t>
-            </a:r>
-            <a:r>
-              <a:rPr lang="en-US" sz="1800" dirty="0">
-                <a:latin typeface="Helvetica" panose="020B0604020202020204" pitchFamily="34" charset="0"/>
-                <a:ea typeface="Constantia" charset="0"/>
-                <a:cs typeface="Helvetica" panose="020B0604020202020204" pitchFamily="34" charset="0"/>
-              </a:rPr>
-              <a:t>: in each direction)</a:t>
-            </a:r>
-            <a:br>
-              <a:rPr lang="en-US" sz="1800" dirty="0">
-                <a:latin typeface="Helvetica" panose="020B0604020202020204" pitchFamily="34" charset="0"/>
-                <a:ea typeface="Constantia" charset="0"/>
-                <a:cs typeface="Helvetica" panose="020B0604020202020204" pitchFamily="34" charset="0"/>
-              </a:rPr>
-            </a:br>
-            <a:r>
-              <a:rPr lang="en-US" sz="1800" dirty="0">
-                <a:latin typeface="Helvetica" panose="020B0604020202020204" pitchFamily="34" charset="0"/>
-                <a:ea typeface="Constantia" charset="0"/>
-                <a:cs typeface="Helvetica" panose="020B0604020202020204" pitchFamily="34" charset="0"/>
-              </a:rPr>
-              <a:t>(if graph given as adjacency list).   </a:t>
-            </a:r>
-          </a:p>
-          <a:p>
-            <a:pPr algn="l"/>
-            <a:endParaRPr lang="en-US" sz="1800" dirty="0">
-              <a:latin typeface="Helvetica" panose="020B0604020202020204" pitchFamily="34" charset="0"/>
-              <a:ea typeface="Constantia" charset="0"/>
-              <a:cs typeface="Helvetica" panose="020B0604020202020204" pitchFamily="34" charset="0"/>
-            </a:endParaRPr>
-          </a:p>
-          <a:p>
-            <a:pPr algn="l"/>
-            <a:r>
-              <a:rPr lang="en-US" sz="1800" dirty="0">
-                <a:latin typeface="Helvetica" panose="020B0604020202020204" pitchFamily="34" charset="0"/>
-                <a:ea typeface="Constantia" charset="0"/>
-                <a:cs typeface="Helvetica" panose="020B0604020202020204" pitchFamily="34" charset="0"/>
-              </a:rPr>
-              <a:t>Just a small amount of work is required to examine each edge. </a:t>
-            </a:r>
-          </a:p>
-          <a:p>
-            <a:pPr algn="l"/>
-            <a:endParaRPr lang="en-US" sz="1800" dirty="0">
-              <a:latin typeface="Helvetica" panose="020B0604020202020204" pitchFamily="34" charset="0"/>
-              <a:ea typeface="Constantia" charset="0"/>
-              <a:cs typeface="Helvetica" panose="020B0604020202020204" pitchFamily="34" charset="0"/>
-            </a:endParaRPr>
-          </a:p>
-          <a:p>
-            <a:pPr algn="l"/>
-            <a:r>
-              <a:rPr lang="en-US" sz="1800" dirty="0">
-                <a:latin typeface="Helvetica" panose="020B0604020202020204" pitchFamily="34" charset="0"/>
-                <a:ea typeface="Constantia" charset="0"/>
-                <a:cs typeface="Helvetica" panose="020B0604020202020204" pitchFamily="34" charset="0"/>
-              </a:rPr>
-              <a:t>Running time is proportional to the number of edges.</a:t>
-            </a:r>
-          </a:p>
-          <a:p>
-            <a:pPr algn="l"/>
-            <a:endParaRPr lang="en-US" sz="1800" dirty="0">
-              <a:latin typeface="Helvetica" panose="020B0604020202020204" pitchFamily="34" charset="0"/>
-              <a:ea typeface="Constantia" charset="0"/>
-              <a:cs typeface="Helvetica" panose="020B0604020202020204" pitchFamily="34" charset="0"/>
-            </a:endParaRPr>
-          </a:p>
-          <a:p>
-            <a:pPr algn="l"/>
-            <a:r>
-              <a:rPr lang="en-US" sz="1800" dirty="0">
-                <a:latin typeface="Helvetica" panose="020B0604020202020204" pitchFamily="34" charset="0"/>
-                <a:ea typeface="Constantia" charset="0"/>
-                <a:cs typeface="Helvetica" panose="020B0604020202020204" pitchFamily="34" charset="0"/>
-              </a:rPr>
-              <a:t>Let’s see it in Python</a:t>
-            </a:r>
-            <a:r>
-              <a:rPr lang="is-IS" sz="1800" dirty="0">
-                <a:latin typeface="Helvetica" panose="020B0604020202020204" pitchFamily="34" charset="0"/>
-                <a:ea typeface="Constantia" charset="0"/>
-                <a:cs typeface="Helvetica" panose="020B0604020202020204" pitchFamily="34" charset="0"/>
-              </a:rPr>
-              <a:t>…</a:t>
-            </a:r>
-            <a:endParaRPr lang="en-US" sz="1800" dirty="0">
-              <a:latin typeface="Helvetica" panose="020B0604020202020204" pitchFamily="34" charset="0"/>
-              <a:ea typeface="Constantia" charset="0"/>
-              <a:cs typeface="Helvetica" panose="020B0604020202020204" pitchFamily="34" charset="0"/>
-            </a:endParaRPr>
-          </a:p>
-        </p:txBody>
-      </p:sp>
-    </p:spTree>
-    <p:extLst>
-      <p:ext uri="{BB962C8B-B14F-4D97-AF65-F5344CB8AC3E}">
-        <p14:creationId xmlns:p14="http://schemas.microsoft.com/office/powerpoint/2010/main" val="457846523"/>
-      </p:ext>
-    </p:extLst>
-  </p:cSld>
-  <p:clrMapOvr>
-    <a:masterClrMapping/>
-  </p:clrMapOvr>
-</p:sld>
-</file>
-
 <file path=ppt/slides/slide17.xml><?xml version="1.0" encoding="utf-8"?>
 <p:sld xmlns:a="http://schemas.openxmlformats.org/drawingml/2006/main" xmlns:r="http://schemas.openxmlformats.org/officeDocument/2006/relationships" xmlns:p="http://schemas.openxmlformats.org/presentationml/2006/main">
   <p:cSld>
@@ -12882,6 +13028,397 @@
       </p:grpSpPr>
       <p:sp>
         <p:nvSpPr>
+          <p:cNvPr id="2" name="Title 1"/>
+          <p:cNvSpPr>
+            <a:spLocks noGrp="1"/>
+          </p:cNvSpPr>
+          <p:nvPr>
+            <p:ph type="title"/>
+          </p:nvPr>
+        </p:nvSpPr>
+        <p:spPr/>
+        <p:txBody>
+          <a:bodyPr/>
+          <a:lstStyle/>
+          <a:p>
+            <a:r>
+              <a:rPr lang="en-US" dirty="0"/>
+              <a:t>BFS – Centralized, Loop-Based Algorithm</a:t>
+            </a:r>
+          </a:p>
+        </p:txBody>
+      </p:sp>
+      <p:sp>
+        <p:nvSpPr>
+          <p:cNvPr id="3" name="TextBox 2"/>
+          <p:cNvSpPr txBox="1"/>
+          <p:nvPr/>
+        </p:nvSpPr>
+        <p:spPr>
+          <a:xfrm>
+            <a:off x="1401473" y="1091862"/>
+            <a:ext cx="5609228" cy="1200329"/>
+          </a:xfrm>
+          <a:prstGeom prst="rect">
+            <a:avLst/>
+          </a:prstGeom>
+          <a:noFill/>
+          <a:ln>
+            <a:solidFill>
+              <a:schemeClr val="tx1"/>
+            </a:solidFill>
+          </a:ln>
+        </p:spPr>
+        <p:txBody>
+          <a:bodyPr wrap="none" rtlCol="0">
+            <a:spAutoFit/>
+          </a:bodyPr>
+          <a:lstStyle/>
+          <a:p>
+            <a:pPr algn="l"/>
+            <a:r>
+              <a:rPr lang="en-US" sz="1800" dirty="0">
+                <a:solidFill>
+                  <a:schemeClr val="accent3"/>
+                </a:solidFill>
+                <a:latin typeface="Helvetica" panose="020B0604020202020204" pitchFamily="34" charset="0"/>
+                <a:ea typeface="Constantia" charset="0"/>
+                <a:cs typeface="Helvetica" panose="020B0604020202020204" pitchFamily="34" charset="0"/>
+              </a:rPr>
+              <a:t>Initialize a </a:t>
+            </a:r>
+            <a:r>
+              <a:rPr lang="en-US" sz="1800" b="1" dirty="0">
+                <a:solidFill>
+                  <a:schemeClr val="accent3"/>
+                </a:solidFill>
+                <a:latin typeface="Helvetica" panose="020B0604020202020204" pitchFamily="34" charset="0"/>
+                <a:ea typeface="Constantia" charset="0"/>
+                <a:cs typeface="Helvetica" panose="020B0604020202020204" pitchFamily="34" charset="0"/>
+              </a:rPr>
+              <a:t>frontier queue</a:t>
+            </a:r>
+            <a:r>
+              <a:rPr lang="en-US" sz="1800" dirty="0">
+                <a:solidFill>
+                  <a:schemeClr val="accent3"/>
+                </a:solidFill>
+                <a:latin typeface="Helvetica" panose="020B0604020202020204" pitchFamily="34" charset="0"/>
+                <a:ea typeface="Constantia" charset="0"/>
+                <a:cs typeface="Helvetica" panose="020B0604020202020204" pitchFamily="34" charset="0"/>
+              </a:rPr>
+              <a:t> with the origin node</a:t>
+            </a:r>
+          </a:p>
+          <a:p>
+            <a:pPr algn="l"/>
+            <a:r>
+              <a:rPr lang="en-US" sz="1800" dirty="0">
+                <a:solidFill>
+                  <a:schemeClr val="accent3"/>
+                </a:solidFill>
+                <a:latin typeface="Helvetica" panose="020B0604020202020204" pitchFamily="34" charset="0"/>
+                <a:ea typeface="Constantia" charset="0"/>
+                <a:cs typeface="Helvetica" panose="020B0604020202020204" pitchFamily="34" charset="0"/>
+              </a:rPr>
+              <a:t>While the </a:t>
+            </a:r>
+            <a:r>
+              <a:rPr lang="en-US" sz="1800" b="1" dirty="0">
+                <a:solidFill>
+                  <a:schemeClr val="accent3"/>
+                </a:solidFill>
+                <a:latin typeface="Helvetica" panose="020B0604020202020204" pitchFamily="34" charset="0"/>
+                <a:ea typeface="Constantia" charset="0"/>
+                <a:cs typeface="Helvetica" panose="020B0604020202020204" pitchFamily="34" charset="0"/>
+              </a:rPr>
+              <a:t>frontier queue</a:t>
+            </a:r>
+            <a:r>
+              <a:rPr lang="en-US" sz="1800" dirty="0">
+                <a:solidFill>
+                  <a:schemeClr val="accent3"/>
+                </a:solidFill>
+                <a:latin typeface="Helvetica" panose="020B0604020202020204" pitchFamily="34" charset="0"/>
+                <a:ea typeface="Constantia" charset="0"/>
+                <a:cs typeface="Helvetica" panose="020B0604020202020204" pitchFamily="34" charset="0"/>
+              </a:rPr>
+              <a:t> has a vertex in it</a:t>
+            </a:r>
+          </a:p>
+          <a:p>
+            <a:pPr algn="l"/>
+            <a:r>
+              <a:rPr lang="en-US" sz="1800" dirty="0">
+                <a:solidFill>
+                  <a:schemeClr val="accent3"/>
+                </a:solidFill>
+                <a:latin typeface="Helvetica" panose="020B0604020202020204" pitchFamily="34" charset="0"/>
+                <a:ea typeface="Constantia" charset="0"/>
+                <a:cs typeface="Helvetica" panose="020B0604020202020204" pitchFamily="34" charset="0"/>
+              </a:rPr>
+              <a:t>	Pick a vertex </a:t>
+            </a:r>
+            <a:r>
+              <a:rPr lang="en-US" sz="1800" b="1" dirty="0" err="1">
+                <a:solidFill>
+                  <a:schemeClr val="accent3"/>
+                </a:solidFill>
+                <a:latin typeface="Helvetica" panose="020B0604020202020204" pitchFamily="34" charset="0"/>
+                <a:ea typeface="Constantia" charset="0"/>
+                <a:cs typeface="Helvetica" panose="020B0604020202020204" pitchFamily="34" charset="0"/>
+              </a:rPr>
+              <a:t>v</a:t>
+            </a:r>
+            <a:r>
+              <a:rPr lang="en-US" sz="1800" dirty="0">
+                <a:solidFill>
+                  <a:schemeClr val="accent3"/>
+                </a:solidFill>
+                <a:latin typeface="Helvetica" panose="020B0604020202020204" pitchFamily="34" charset="0"/>
+                <a:ea typeface="Constantia" charset="0"/>
+                <a:cs typeface="Helvetica" panose="020B0604020202020204" pitchFamily="34" charset="0"/>
+              </a:rPr>
+              <a:t> from the front of the queue</a:t>
+            </a:r>
+          </a:p>
+          <a:p>
+            <a:pPr algn="l"/>
+            <a:r>
+              <a:rPr lang="en-US" sz="1800" dirty="0">
+                <a:solidFill>
+                  <a:schemeClr val="accent3"/>
+                </a:solidFill>
+                <a:latin typeface="Helvetica" panose="020B0604020202020204" pitchFamily="34" charset="0"/>
+                <a:ea typeface="Constantia" charset="0"/>
+                <a:cs typeface="Helvetica" panose="020B0604020202020204" pitchFamily="34" charset="0"/>
+              </a:rPr>
+              <a:t>	Put each unexplored neighbor of v in </a:t>
+            </a:r>
+            <a:r>
+              <a:rPr lang="en-US" sz="1800" b="1" dirty="0">
+                <a:solidFill>
+                  <a:schemeClr val="accent3"/>
+                </a:solidFill>
+                <a:latin typeface="Helvetica" panose="020B0604020202020204" pitchFamily="34" charset="0"/>
+                <a:ea typeface="Constantia" charset="0"/>
+                <a:cs typeface="Helvetica" panose="020B0604020202020204" pitchFamily="34" charset="0"/>
+              </a:rPr>
+              <a:t>queue</a:t>
+            </a:r>
+          </a:p>
+        </p:txBody>
+      </p:sp>
+      <p:sp>
+        <p:nvSpPr>
+          <p:cNvPr id="5" name="TextBox 4"/>
+          <p:cNvSpPr txBox="1"/>
+          <p:nvPr/>
+        </p:nvSpPr>
+        <p:spPr>
+          <a:xfrm>
+            <a:off x="1069711" y="2637766"/>
+            <a:ext cx="7400424" cy="2862322"/>
+          </a:xfrm>
+          <a:prstGeom prst="rect">
+            <a:avLst/>
+          </a:prstGeom>
+          <a:noFill/>
+        </p:spPr>
+        <p:txBody>
+          <a:bodyPr wrap="none" rtlCol="0">
+            <a:spAutoFit/>
+          </a:bodyPr>
+          <a:lstStyle/>
+          <a:p>
+            <a:r>
+              <a:rPr lang="en-US" sz="1800" i="1" dirty="0">
+                <a:latin typeface="Helvetica" panose="020B0604020202020204" pitchFamily="34" charset="0"/>
+                <a:ea typeface="Constantia" charset="0"/>
+                <a:cs typeface="Helvetica" panose="020B0604020202020204" pitchFamily="34" charset="0"/>
+              </a:rPr>
+              <a:t>Note closer edges are always considered before more distant edges. </a:t>
+            </a:r>
+          </a:p>
+          <a:p>
+            <a:endParaRPr lang="en-US" sz="1800" i="1" dirty="0">
+              <a:latin typeface="Helvetica" panose="020B0604020202020204" pitchFamily="34" charset="0"/>
+              <a:ea typeface="Constantia" charset="0"/>
+              <a:cs typeface="Helvetica" panose="020B0604020202020204" pitchFamily="34" charset="0"/>
+            </a:endParaRPr>
+          </a:p>
+          <a:p>
+            <a:r>
+              <a:rPr lang="en-US" sz="1800" dirty="0">
+                <a:solidFill>
+                  <a:srgbClr val="9C5238"/>
+                </a:solidFill>
+                <a:latin typeface="Helvetica" panose="020B0604020202020204" pitchFamily="34" charset="0"/>
+                <a:ea typeface="Constantia" charset="0"/>
+                <a:cs typeface="Helvetica" panose="020B0604020202020204" pitchFamily="34" charset="0"/>
+              </a:rPr>
+              <a:t>Efficiency: </a:t>
+            </a:r>
+            <a:r>
+              <a:rPr lang="en-US" sz="1800" dirty="0">
+                <a:latin typeface="Helvetica" panose="020B0604020202020204" pitchFamily="34" charset="0"/>
+                <a:ea typeface="Constantia" charset="0"/>
+                <a:cs typeface="Helvetica" panose="020B0604020202020204" pitchFamily="34" charset="0"/>
+              </a:rPr>
+              <a:t>Each edge is examined </a:t>
+            </a:r>
+            <a:r>
+              <a:rPr lang="en-US" sz="1800" b="1" dirty="0">
+                <a:latin typeface="Helvetica" panose="020B0604020202020204" pitchFamily="34" charset="0"/>
+                <a:ea typeface="Constantia" charset="0"/>
+                <a:cs typeface="Helvetica" panose="020B0604020202020204" pitchFamily="34" charset="0"/>
+              </a:rPr>
+              <a:t>once</a:t>
+            </a:r>
+            <a:r>
+              <a:rPr lang="en-US" sz="1800" dirty="0">
+                <a:latin typeface="Helvetica" panose="020B0604020202020204" pitchFamily="34" charset="0"/>
+                <a:ea typeface="Constantia" charset="0"/>
+                <a:cs typeface="Helvetica" panose="020B0604020202020204" pitchFamily="34" charset="0"/>
+              </a:rPr>
+              <a:t> (</a:t>
+            </a:r>
+            <a:r>
+              <a:rPr lang="en-US" sz="1800" i="1" dirty="0">
+                <a:latin typeface="Helvetica" panose="020B0604020202020204" pitchFamily="34" charset="0"/>
+                <a:ea typeface="Constantia" charset="0"/>
+                <a:cs typeface="Helvetica" panose="020B0604020202020204" pitchFamily="34" charset="0"/>
+              </a:rPr>
+              <a:t>undirected</a:t>
+            </a:r>
+            <a:r>
+              <a:rPr lang="en-US" sz="1800" dirty="0">
+                <a:latin typeface="Helvetica" panose="020B0604020202020204" pitchFamily="34" charset="0"/>
+                <a:ea typeface="Constantia" charset="0"/>
+                <a:cs typeface="Helvetica" panose="020B0604020202020204" pitchFamily="34" charset="0"/>
+              </a:rPr>
+              <a:t>: in each direction)</a:t>
+            </a:r>
+            <a:br>
+              <a:rPr lang="en-US" sz="1800" dirty="0">
+                <a:latin typeface="Helvetica" panose="020B0604020202020204" pitchFamily="34" charset="0"/>
+                <a:ea typeface="Constantia" charset="0"/>
+                <a:cs typeface="Helvetica" panose="020B0604020202020204" pitchFamily="34" charset="0"/>
+              </a:rPr>
+            </a:br>
+            <a:r>
+              <a:rPr lang="en-US" sz="1800" dirty="0">
+                <a:latin typeface="Helvetica" panose="020B0604020202020204" pitchFamily="34" charset="0"/>
+                <a:ea typeface="Constantia" charset="0"/>
+                <a:cs typeface="Helvetica" panose="020B0604020202020204" pitchFamily="34" charset="0"/>
+              </a:rPr>
+              <a:t>(if graph given as adjacency list).   </a:t>
+            </a:r>
+          </a:p>
+          <a:p>
+            <a:pPr algn="l"/>
+            <a:endParaRPr lang="en-US" sz="1800" dirty="0">
+              <a:latin typeface="Helvetica" panose="020B0604020202020204" pitchFamily="34" charset="0"/>
+              <a:ea typeface="Constantia" charset="0"/>
+              <a:cs typeface="Helvetica" panose="020B0604020202020204" pitchFamily="34" charset="0"/>
+            </a:endParaRPr>
+          </a:p>
+          <a:p>
+            <a:pPr algn="l"/>
+            <a:r>
+              <a:rPr lang="en-US" sz="1800" dirty="0">
+                <a:latin typeface="Helvetica" panose="020B0604020202020204" pitchFamily="34" charset="0"/>
+                <a:ea typeface="Constantia" charset="0"/>
+                <a:cs typeface="Helvetica" panose="020B0604020202020204" pitchFamily="34" charset="0"/>
+              </a:rPr>
+              <a:t>Just a small amount of work is required to examine each edge. </a:t>
+            </a:r>
+          </a:p>
+          <a:p>
+            <a:pPr algn="l"/>
+            <a:endParaRPr lang="en-US" sz="1800" dirty="0">
+              <a:latin typeface="Helvetica" panose="020B0604020202020204" pitchFamily="34" charset="0"/>
+              <a:ea typeface="Constantia" charset="0"/>
+              <a:cs typeface="Helvetica" panose="020B0604020202020204" pitchFamily="34" charset="0"/>
+            </a:endParaRPr>
+          </a:p>
+          <a:p>
+            <a:pPr algn="l"/>
+            <a:r>
+              <a:rPr lang="en-US" sz="1800" dirty="0">
+                <a:latin typeface="Helvetica" panose="020B0604020202020204" pitchFamily="34" charset="0"/>
+                <a:ea typeface="Constantia" charset="0"/>
+                <a:cs typeface="Helvetica" panose="020B0604020202020204" pitchFamily="34" charset="0"/>
+              </a:rPr>
+              <a:t>Running time is proportional to the number of edges.</a:t>
+            </a:r>
+          </a:p>
+          <a:p>
+            <a:pPr algn="l"/>
+            <a:endParaRPr lang="en-US" sz="1800" dirty="0">
+              <a:latin typeface="Helvetica" panose="020B0604020202020204" pitchFamily="34" charset="0"/>
+              <a:ea typeface="Constantia" charset="0"/>
+              <a:cs typeface="Helvetica" panose="020B0604020202020204" pitchFamily="34" charset="0"/>
+            </a:endParaRPr>
+          </a:p>
+          <a:p>
+            <a:pPr algn="l"/>
+            <a:r>
+              <a:rPr lang="en-US" sz="1800" dirty="0">
+                <a:latin typeface="Helvetica" panose="020B0604020202020204" pitchFamily="34" charset="0"/>
+                <a:ea typeface="Constantia" charset="0"/>
+                <a:cs typeface="Helvetica" panose="020B0604020202020204" pitchFamily="34" charset="0"/>
+              </a:rPr>
+              <a:t>Let’s see it in Python</a:t>
+            </a:r>
+            <a:r>
+              <a:rPr lang="is-IS" sz="1800" dirty="0">
+                <a:latin typeface="Helvetica" panose="020B0604020202020204" pitchFamily="34" charset="0"/>
+                <a:ea typeface="Constantia" charset="0"/>
+                <a:cs typeface="Helvetica" panose="020B0604020202020204" pitchFamily="34" charset="0"/>
+              </a:rPr>
+              <a:t>…</a:t>
+            </a:r>
+            <a:endParaRPr lang="en-US" sz="1800" dirty="0">
+              <a:latin typeface="Helvetica" panose="020B0604020202020204" pitchFamily="34" charset="0"/>
+              <a:ea typeface="Constantia" charset="0"/>
+              <a:cs typeface="Helvetica" panose="020B0604020202020204" pitchFamily="34" charset="0"/>
+            </a:endParaRPr>
+          </a:p>
+        </p:txBody>
+      </p:sp>
+    </p:spTree>
+    <p:extLst>
+      <p:ext uri="{BB962C8B-B14F-4D97-AF65-F5344CB8AC3E}">
+        <p14:creationId xmlns:p14="http://schemas.microsoft.com/office/powerpoint/2010/main" val="457846523"/>
+      </p:ext>
+    </p:extLst>
+  </p:cSld>
+  <p:clrMapOvr>
+    <a:masterClrMapping/>
+  </p:clrMapOvr>
+</p:sld>
+</file>
+
+<file path=ppt/slides/slide18.xml><?xml version="1.0" encoding="utf-8"?>
+<p:sld xmlns:a="http://schemas.openxmlformats.org/drawingml/2006/main" xmlns:r="http://schemas.openxmlformats.org/officeDocument/2006/relationships" xmlns:p="http://schemas.openxmlformats.org/presentationml/2006/main">
+  <p:cSld>
+    <p:spTree>
+      <p:nvGrpSpPr>
+        <p:cNvPr id="1" name=""/>
+        <p:cNvGrpSpPr/>
+        <p:nvPr/>
+      </p:nvGrpSpPr>
+      <p:grpSpPr>
+        <a:xfrm>
+          <a:off x="0" y="0"/>
+          <a:ext cx="0" cy="0"/>
+          <a:chOff x="0" y="0"/>
+          <a:chExt cx="0" cy="0"/>
+        </a:xfrm>
+      </p:grpSpPr>
+      <p:sp>
+        <p:nvSpPr>
           <p:cNvPr id="4" name="Slide Number Placeholder 3"/>
           <p:cNvSpPr>
             <a:spLocks noGrp="1"/>
@@ -12898,7 +13435,7 @@
             <a:fld id="{05072F42-4DFA-4725-86F9-7594E4AB4EB5}" type="slidenum">
               <a:rPr lang="en-GB" smtClean="0"/>
               <a:pPr/>
-              <a:t>17</a:t>
+              <a:t>18</a:t>
             </a:fld>
             <a:endParaRPr lang="en-GB"/>
           </a:p>
@@ -13511,157 +14048,6 @@
 </p:sld>
 </file>
 
-<file path=ppt/slides/slide18.xml><?xml version="1.0" encoding="utf-8"?>
-<p:sld xmlns:a="http://schemas.openxmlformats.org/drawingml/2006/main" xmlns:r="http://schemas.openxmlformats.org/officeDocument/2006/relationships" xmlns:p="http://schemas.openxmlformats.org/presentationml/2006/main">
-  <p:cSld>
-    <p:spTree>
-      <p:nvGrpSpPr>
-        <p:cNvPr id="1" name=""/>
-        <p:cNvGrpSpPr/>
-        <p:nvPr/>
-      </p:nvGrpSpPr>
-      <p:grpSpPr>
-        <a:xfrm>
-          <a:off x="0" y="0"/>
-          <a:ext cx="0" cy="0"/>
-          <a:chOff x="0" y="0"/>
-          <a:chExt cx="0" cy="0"/>
-        </a:xfrm>
-      </p:grpSpPr>
-      <p:sp>
-        <p:nvSpPr>
-          <p:cNvPr id="4" name="Title 3">
-            <a:extLst>
-              <a:ext uri="{FF2B5EF4-FFF2-40B4-BE49-F238E27FC236}">
-                <a16:creationId xmlns:a16="http://schemas.microsoft.com/office/drawing/2014/main" id="{54798799-1CDD-460D-B678-AA47009B2A00}"/>
-              </a:ext>
-            </a:extLst>
-          </p:cNvPr>
-          <p:cNvSpPr>
-            <a:spLocks noGrp="1"/>
-          </p:cNvSpPr>
-          <p:nvPr>
-            <p:ph type="title"/>
-          </p:nvPr>
-        </p:nvSpPr>
-        <p:spPr/>
-        <p:txBody>
-          <a:bodyPr/>
-          <a:lstStyle/>
-          <a:p>
-            <a:r>
-              <a:rPr lang="en-US" dirty="0"/>
-              <a:t>Thinking Differently</a:t>
-            </a:r>
-          </a:p>
-        </p:txBody>
-      </p:sp>
-      <p:sp>
-        <p:nvSpPr>
-          <p:cNvPr id="5" name="Content Placeholder 4">
-            <a:extLst>
-              <a:ext uri="{FF2B5EF4-FFF2-40B4-BE49-F238E27FC236}">
-                <a16:creationId xmlns:a16="http://schemas.microsoft.com/office/drawing/2014/main" id="{4A12006B-A2A6-44DC-8ECF-AB3DDB6DB946}"/>
-              </a:ext>
-            </a:extLst>
-          </p:cNvPr>
-          <p:cNvSpPr>
-            <a:spLocks noGrp="1"/>
-          </p:cNvSpPr>
-          <p:nvPr>
-            <p:ph idx="1"/>
-          </p:nvPr>
-        </p:nvSpPr>
-        <p:spPr>
-          <a:xfrm>
-            <a:off x="470263" y="1457743"/>
-            <a:ext cx="8157007" cy="2536742"/>
-          </a:xfrm>
-        </p:spPr>
-        <p:txBody>
-          <a:bodyPr/>
-          <a:lstStyle/>
-          <a:p>
-            <a:r>
-              <a:rPr lang="en-US" dirty="0"/>
-              <a:t>The previous algorithm relied on </a:t>
-            </a:r>
-            <a:r>
-              <a:rPr lang="en-US" b="1" dirty="0"/>
-              <a:t>sequence</a:t>
-            </a:r>
-            <a:r>
-              <a:rPr lang="en-US" dirty="0"/>
-              <a:t> to avoid redundant work – every node was visited at the earliest point possible, and never again</a:t>
-            </a:r>
-          </a:p>
-          <a:p>
-            <a:endParaRPr lang="en-US" dirty="0"/>
-          </a:p>
-          <a:p>
-            <a:r>
-              <a:rPr lang="en-US" dirty="0"/>
-              <a:t>We want to (partly) </a:t>
-            </a:r>
-            <a:r>
-              <a:rPr lang="en-US" b="1" dirty="0"/>
-              <a:t>parallelize</a:t>
-            </a:r>
-            <a:r>
-              <a:rPr lang="en-US" dirty="0"/>
-              <a:t>, which may introduce redundant, but not sequenced, work!</a:t>
-            </a:r>
-          </a:p>
-        </p:txBody>
-      </p:sp>
-      <p:sp>
-        <p:nvSpPr>
-          <p:cNvPr id="3" name="Slide Number Placeholder 2">
-            <a:extLst>
-              <a:ext uri="{FF2B5EF4-FFF2-40B4-BE49-F238E27FC236}">
-                <a16:creationId xmlns:a16="http://schemas.microsoft.com/office/drawing/2014/main" id="{53A5A0DC-1479-4863-A31A-3E78F6F2BCA2}"/>
-              </a:ext>
-            </a:extLst>
-          </p:cNvPr>
-          <p:cNvSpPr>
-            <a:spLocks noGrp="1"/>
-          </p:cNvSpPr>
-          <p:nvPr>
-            <p:ph type="sldNum" sz="quarter" idx="12"/>
-          </p:nvPr>
-        </p:nvSpPr>
-        <p:spPr/>
-        <p:txBody>
-          <a:bodyPr/>
-          <a:lstStyle/>
-          <a:p>
-            <a:pPr>
-              <a:defRPr/>
-            </a:pPr>
-            <a:fld id="{7E1F828E-4B39-DC4D-A599-36004B51E205}" type="slidenum">
-              <a:rPr lang="en-US" smtClean="0"/>
-              <a:pPr>
-                <a:defRPr/>
-              </a:pPr>
-              <a:t>18</a:t>
-            </a:fld>
-            <a:endParaRPr lang="en-US"/>
-          </a:p>
-        </p:txBody>
-      </p:sp>
-    </p:spTree>
-    <p:extLst>
-      <p:ext uri="{BB962C8B-B14F-4D97-AF65-F5344CB8AC3E}">
-        <p14:creationId xmlns:p14="http://schemas.microsoft.com/office/powerpoint/2010/main" val="1174940263"/>
-      </p:ext>
-    </p:extLst>
-  </p:cSld>
-  <p:clrMapOvr>
-    <a:masterClrMapping/>
-  </p:clrMapOvr>
-</p:sld>
-</file>
-
 <file path=ppt/slides/slide19.xml><?xml version="1.0" encoding="utf-8"?>
 <p:sld xmlns:a="http://schemas.openxmlformats.org/drawingml/2006/main" xmlns:r="http://schemas.openxmlformats.org/officeDocument/2006/relationships" xmlns:p="http://schemas.openxmlformats.org/presentationml/2006/main">
   <p:cSld>
@@ -13681,7 +14067,13 @@
       </p:grpSpPr>
       <p:sp>
         <p:nvSpPr>
-          <p:cNvPr id="5" name="Title 4"/>
+          <p:cNvPr id="4" name="Title 3">
+            <a:extLst>
+              <a:ext uri="{FF2B5EF4-FFF2-40B4-BE49-F238E27FC236}">
+                <a16:creationId xmlns:a16="http://schemas.microsoft.com/office/drawing/2014/main" id="{54798799-1CDD-460D-B678-AA47009B2A00}"/>
+              </a:ext>
+            </a:extLst>
+          </p:cNvPr>
           <p:cNvSpPr>
             <a:spLocks noGrp="1"/>
           </p:cNvSpPr>
@@ -13696,33 +14088,101 @@
           <a:p>
             <a:r>
               <a:rPr lang="en-US" dirty="0"/>
-              <a:t>A Few Applications of BFS</a:t>
-            </a:r>
-          </a:p>
-        </p:txBody>
-      </p:sp>
-      <p:sp>
-        <p:nvSpPr>
-          <p:cNvPr id="6" name="Text Placeholder 5"/>
+              <a:t>Breadth-First Search Summarized,</a:t>
+            </a:r>
+            <a:br>
+              <a:rPr lang="en-US" dirty="0"/>
+            </a:br>
+            <a:r>
+              <a:rPr lang="en-US" dirty="0"/>
+              <a:t>on a Single Computer</a:t>
+            </a:r>
+          </a:p>
+        </p:txBody>
+      </p:sp>
+      <p:sp>
+        <p:nvSpPr>
+          <p:cNvPr id="5" name="Content Placeholder 4">
+            <a:extLst>
+              <a:ext uri="{FF2B5EF4-FFF2-40B4-BE49-F238E27FC236}">
+                <a16:creationId xmlns:a16="http://schemas.microsoft.com/office/drawing/2014/main" id="{4A12006B-A2A6-44DC-8ECF-AB3DDB6DB946}"/>
+              </a:ext>
+            </a:extLst>
+          </p:cNvPr>
           <p:cNvSpPr>
             <a:spLocks noGrp="1"/>
           </p:cNvSpPr>
           <p:nvPr>
-            <p:ph type="body" idx="1"/>
+            <p:ph idx="1"/>
           </p:nvPr>
         </p:nvSpPr>
-        <p:spPr/>
+        <p:spPr>
+          <a:xfrm>
+            <a:off x="470263" y="1457743"/>
+            <a:ext cx="8157007" cy="2536742"/>
+          </a:xfrm>
+        </p:spPr>
         <p:txBody>
           <a:bodyPr/>
           <a:lstStyle/>
           <a:p>
-            <a:endParaRPr lang="en-US"/>
-          </a:p>
-        </p:txBody>
-      </p:sp>
-      <p:sp>
-        <p:nvSpPr>
-          <p:cNvPr id="4" name="Slide Number Placeholder 3"/>
+            <a:r>
+              <a:rPr lang="en-US" dirty="0"/>
+              <a:t>In a centralized algorithm, we rely on two things:</a:t>
+            </a:r>
+          </a:p>
+          <a:p>
+            <a:endParaRPr lang="en-US" dirty="0"/>
+          </a:p>
+          <a:p>
+            <a:pPr lvl="1"/>
+            <a:r>
+              <a:rPr lang="en-US" dirty="0"/>
+              <a:t>The </a:t>
+            </a:r>
+            <a:r>
+              <a:rPr lang="en-US" b="1" dirty="0"/>
+              <a:t>frontier queue</a:t>
+            </a:r>
+            <a:r>
+              <a:rPr lang="en-US" dirty="0"/>
+              <a:t> guarantees we visit closer nodes before we visit further-away nodes</a:t>
+            </a:r>
+          </a:p>
+          <a:p>
+            <a:pPr lvl="1"/>
+            <a:endParaRPr lang="en-US" dirty="0"/>
+          </a:p>
+          <a:p>
+            <a:pPr lvl="1"/>
+            <a:r>
+              <a:rPr lang="en-US" dirty="0"/>
+              <a:t>The </a:t>
+            </a:r>
+            <a:r>
+              <a:rPr lang="en-US" b="1" dirty="0"/>
+              <a:t>visited set</a:t>
+            </a:r>
+            <a:r>
+              <a:rPr lang="en-US" dirty="0"/>
+              <a:t> lets us avoid back-tracking to a previous node</a:t>
+            </a:r>
+          </a:p>
+          <a:p>
+            <a:pPr lvl="1"/>
+            <a:endParaRPr lang="en-US" dirty="0"/>
+          </a:p>
+        </p:txBody>
+      </p:sp>
+      <p:sp>
+        <p:nvSpPr>
+          <p:cNvPr id="3" name="Slide Number Placeholder 2">
+            <a:extLst>
+              <a:ext uri="{FF2B5EF4-FFF2-40B4-BE49-F238E27FC236}">
+                <a16:creationId xmlns:a16="http://schemas.microsoft.com/office/drawing/2014/main" id="{53A5A0DC-1479-4863-A31A-3E78F6F2BCA2}"/>
+              </a:ext>
+            </a:extLst>
+          </p:cNvPr>
           <p:cNvSpPr>
             <a:spLocks noGrp="1"/>
           </p:cNvSpPr>
@@ -13735,19 +14195,24 @@
           <a:bodyPr/>
           <a:lstStyle/>
           <a:p>
-            <a:fld id="{05072F42-4DFA-4725-86F9-7594E4AB4EB5}" type="slidenum">
-              <a:rPr lang="en-GB" smtClean="0"/>
-              <a:pPr/>
+            <a:pPr>
+              <a:defRPr/>
+            </a:pPr>
+            <a:fld id="{7E1F828E-4B39-DC4D-A599-36004B51E205}" type="slidenum">
+              <a:rPr lang="en-US" smtClean="0"/>
+              <a:pPr>
+                <a:defRPr/>
+              </a:pPr>
               <a:t>19</a:t>
             </a:fld>
-            <a:endParaRPr lang="en-GB"/>
+            <a:endParaRPr lang="en-US"/>
           </a:p>
         </p:txBody>
       </p:sp>
     </p:spTree>
     <p:extLst>
       <p:ext uri="{BB962C8B-B14F-4D97-AF65-F5344CB8AC3E}">
-        <p14:creationId xmlns:p14="http://schemas.microsoft.com/office/powerpoint/2010/main" val="3260512959"/>
+        <p14:creationId xmlns:p14="http://schemas.microsoft.com/office/powerpoint/2010/main" val="1174940263"/>
       </p:ext>
     </p:extLst>
   </p:cSld>
@@ -13937,7 +14402,7 @@
           <p:nvPr/>
         </p:nvPicPr>
         <p:blipFill>
-          <a:blip r:embed="rId2" cstate="print">
+          <a:blip r:embed="rId3" cstate="print">
             <a:clrChange>
               <a:clrFrom>
                 <a:srgbClr val="FFFFFF"/>
@@ -14012,6 +14477,101 @@
           <a:p>
             <a:r>
               <a:rPr lang="en-US" dirty="0"/>
+              <a:t>A Few Applications of BFS</a:t>
+            </a:r>
+          </a:p>
+        </p:txBody>
+      </p:sp>
+      <p:sp>
+        <p:nvSpPr>
+          <p:cNvPr id="6" name="Text Placeholder 5"/>
+          <p:cNvSpPr>
+            <a:spLocks noGrp="1"/>
+          </p:cNvSpPr>
+          <p:nvPr>
+            <p:ph type="body" idx="1"/>
+          </p:nvPr>
+        </p:nvSpPr>
+        <p:spPr/>
+        <p:txBody>
+          <a:bodyPr/>
+          <a:lstStyle/>
+          <a:p>
+            <a:endParaRPr lang="en-US"/>
+          </a:p>
+        </p:txBody>
+      </p:sp>
+      <p:sp>
+        <p:nvSpPr>
+          <p:cNvPr id="4" name="Slide Number Placeholder 3"/>
+          <p:cNvSpPr>
+            <a:spLocks noGrp="1"/>
+          </p:cNvSpPr>
+          <p:nvPr>
+            <p:ph type="sldNum" sz="quarter" idx="12"/>
+          </p:nvPr>
+        </p:nvSpPr>
+        <p:spPr/>
+        <p:txBody>
+          <a:bodyPr/>
+          <a:lstStyle/>
+          <a:p>
+            <a:fld id="{05072F42-4DFA-4725-86F9-7594E4AB4EB5}" type="slidenum">
+              <a:rPr lang="en-GB" smtClean="0"/>
+              <a:pPr/>
+              <a:t>20</a:t>
+            </a:fld>
+            <a:endParaRPr lang="en-GB"/>
+          </a:p>
+        </p:txBody>
+      </p:sp>
+    </p:spTree>
+    <p:extLst>
+      <p:ext uri="{BB962C8B-B14F-4D97-AF65-F5344CB8AC3E}">
+        <p14:creationId xmlns:p14="http://schemas.microsoft.com/office/powerpoint/2010/main" val="3260512959"/>
+      </p:ext>
+    </p:extLst>
+  </p:cSld>
+  <p:clrMapOvr>
+    <a:masterClrMapping/>
+  </p:clrMapOvr>
+</p:sld>
+</file>
+
+<file path=ppt/slides/slide21.xml><?xml version="1.0" encoding="utf-8"?>
+<p:sld xmlns:a="http://schemas.openxmlformats.org/drawingml/2006/main" xmlns:r="http://schemas.openxmlformats.org/officeDocument/2006/relationships" xmlns:p="http://schemas.openxmlformats.org/presentationml/2006/main">
+  <p:cSld>
+    <p:spTree>
+      <p:nvGrpSpPr>
+        <p:cNvPr id="1" name=""/>
+        <p:cNvGrpSpPr/>
+        <p:nvPr/>
+      </p:nvGrpSpPr>
+      <p:grpSpPr>
+        <a:xfrm>
+          <a:off x="0" y="0"/>
+          <a:ext cx="0" cy="0"/>
+          <a:chOff x="0" y="0"/>
+          <a:chExt cx="0" cy="0"/>
+        </a:xfrm>
+      </p:grpSpPr>
+      <p:sp>
+        <p:nvSpPr>
+          <p:cNvPr id="5" name="Title 4"/>
+          <p:cNvSpPr>
+            <a:spLocks noGrp="1"/>
+          </p:cNvSpPr>
+          <p:nvPr>
+            <p:ph type="title"/>
+          </p:nvPr>
+        </p:nvSpPr>
+        <p:spPr/>
+        <p:txBody>
+          <a:bodyPr/>
+          <a:lstStyle/>
+          <a:p>
+            <a:r>
+              <a:rPr lang="en-US" dirty="0"/>
               <a:t>A Common Question</a:t>
             </a:r>
           </a:p>
@@ -14112,7 +14672,7 @@
             <a:fld id="{05072F42-4DFA-4725-86F9-7594E4AB4EB5}" type="slidenum">
               <a:rPr lang="en-GB" smtClean="0"/>
               <a:pPr/>
-              <a:t>20</a:t>
+              <a:t>21</a:t>
             </a:fld>
             <a:endParaRPr lang="en-GB"/>
           </a:p>
@@ -16468,7 +17028,7 @@
 </p:sld>
 </file>
 
-<file path=ppt/slides/slide21.xml><?xml version="1.0" encoding="utf-8"?>
+<file path=ppt/slides/slide22.xml><?xml version="1.0" encoding="utf-8"?>
 <p:sld xmlns:a="http://schemas.openxmlformats.org/drawingml/2006/main" xmlns:r="http://schemas.openxmlformats.org/officeDocument/2006/relationships" xmlns:p="http://schemas.openxmlformats.org/presentationml/2006/main">
   <p:cSld>
     <p:spTree>
@@ -17386,7 +17946,7 @@
 </p:sld>
 </file>
 
-<file path=ppt/slides/slide22.xml><?xml version="1.0" encoding="utf-8"?>
+<file path=ppt/slides/slide23.xml><?xml version="1.0" encoding="utf-8"?>
 <p:sld xmlns:a="http://schemas.openxmlformats.org/drawingml/2006/main" xmlns:r="http://schemas.openxmlformats.org/officeDocument/2006/relationships" xmlns:p="http://schemas.openxmlformats.org/presentationml/2006/main">
   <p:cSld>
     <p:spTree>
@@ -18377,190 +18937,6 @@
 </p:sld>
 </file>
 
-<file path=ppt/slides/slide23.xml><?xml version="1.0" encoding="utf-8"?>
-<p:sld xmlns:a="http://schemas.openxmlformats.org/drawingml/2006/main" xmlns:r="http://schemas.openxmlformats.org/officeDocument/2006/relationships" xmlns:p="http://schemas.openxmlformats.org/presentationml/2006/main">
-  <p:cSld>
-    <p:spTree>
-      <p:nvGrpSpPr>
-        <p:cNvPr id="1" name=""/>
-        <p:cNvGrpSpPr/>
-        <p:nvPr/>
-      </p:nvGrpSpPr>
-      <p:grpSpPr>
-        <a:xfrm>
-          <a:off x="0" y="0"/>
-          <a:ext cx="0" cy="0"/>
-          <a:chOff x="0" y="0"/>
-          <a:chExt cx="0" cy="0"/>
-        </a:xfrm>
-      </p:grpSpPr>
-      <p:sp>
-        <p:nvSpPr>
-          <p:cNvPr id="5" name="Title 4"/>
-          <p:cNvSpPr>
-            <a:spLocks noGrp="1"/>
-          </p:cNvSpPr>
-          <p:nvPr>
-            <p:ph type="title"/>
-          </p:nvPr>
-        </p:nvSpPr>
-        <p:spPr/>
-        <p:txBody>
-          <a:bodyPr/>
-          <a:lstStyle/>
-          <a:p>
-            <a:r>
-              <a:rPr lang="en-US" dirty="0"/>
-              <a:t>A Sketch of a Solution</a:t>
-            </a:r>
-          </a:p>
-        </p:txBody>
-      </p:sp>
-      <p:sp>
-        <p:nvSpPr>
-          <p:cNvPr id="6" name="Content Placeholder 5"/>
-          <p:cNvSpPr>
-            <a:spLocks noGrp="1"/>
-          </p:cNvSpPr>
-          <p:nvPr>
-            <p:ph idx="1"/>
-          </p:nvPr>
-        </p:nvSpPr>
-        <p:spPr>
-          <a:xfrm>
-            <a:off x="986993" y="1249493"/>
-            <a:ext cx="7226732" cy="3764592"/>
-          </a:xfrm>
-        </p:spPr>
-        <p:txBody>
-          <a:bodyPr/>
-          <a:lstStyle/>
-          <a:p>
-            <a:r>
-              <a:rPr lang="en-US" dirty="0"/>
-              <a:t>Run BFS from “us” to find </a:t>
-            </a:r>
-            <a:r>
-              <a:rPr lang="en-US" b="1" dirty="0"/>
-              <a:t>friends</a:t>
-            </a:r>
-            <a:r>
-              <a:rPr lang="en-US" dirty="0"/>
-              <a:t> (nodes at depth 1) and </a:t>
-            </a:r>
-            <a:r>
-              <a:rPr lang="en-US" b="1" dirty="0"/>
-              <a:t>friends of our friends </a:t>
-            </a:r>
-            <a:r>
-              <a:rPr lang="en-US" dirty="0"/>
-              <a:t>(nodes with min depth 2)</a:t>
-            </a:r>
-            <a:endParaRPr lang="en-US" b="1" dirty="0"/>
-          </a:p>
-          <a:p>
-            <a:endParaRPr lang="en-US" dirty="0"/>
-          </a:p>
-          <a:p>
-            <a:r>
-              <a:rPr lang="en-US" dirty="0"/>
-              <a:t>Run BFS from </a:t>
-            </a:r>
-            <a:r>
-              <a:rPr lang="en-US" dirty="0" err="1"/>
-              <a:t>FoF</a:t>
-            </a:r>
-            <a:r>
-              <a:rPr lang="en-US" dirty="0"/>
-              <a:t> to depth 1</a:t>
-            </a:r>
-          </a:p>
-          <a:p>
-            <a:endParaRPr lang="en-US" dirty="0"/>
-          </a:p>
-          <a:p>
-            <a:r>
-              <a:rPr lang="en-US" dirty="0"/>
-              <a:t>For each </a:t>
-            </a:r>
-            <a:r>
-              <a:rPr lang="en-US" dirty="0" err="1"/>
-              <a:t>FoF</a:t>
-            </a:r>
-            <a:r>
-              <a:rPr lang="en-US" dirty="0"/>
-              <a:t> n, count how many </a:t>
-            </a:r>
-            <a:r>
-              <a:rPr lang="en-US" b="1" dirty="0"/>
-              <a:t>of our friends are in common</a:t>
-            </a:r>
-            <a:endParaRPr lang="en-US" dirty="0"/>
-          </a:p>
-          <a:p>
-            <a:endParaRPr lang="en-US" dirty="0"/>
-          </a:p>
-          <a:p>
-            <a:r>
-              <a:rPr lang="en-US" dirty="0"/>
-              <a:t>Rank each </a:t>
-            </a:r>
-            <a:r>
-              <a:rPr lang="en-US" dirty="0" err="1"/>
-              <a:t>FoF</a:t>
-            </a:r>
-            <a:r>
-              <a:rPr lang="en-US" dirty="0"/>
-              <a:t> </a:t>
-            </a:r>
-            <a:r>
-              <a:rPr lang="en-US" i="1" dirty="0"/>
-              <a:t>n</a:t>
-            </a:r>
-            <a:r>
-              <a:rPr lang="en-US" dirty="0"/>
-              <a:t> by how many friends we have in common</a:t>
-            </a:r>
-          </a:p>
-        </p:txBody>
-      </p:sp>
-      <p:sp>
-        <p:nvSpPr>
-          <p:cNvPr id="4" name="Slide Number Placeholder 3"/>
-          <p:cNvSpPr>
-            <a:spLocks noGrp="1"/>
-          </p:cNvSpPr>
-          <p:nvPr>
-            <p:ph type="sldNum" sz="quarter" idx="12"/>
-          </p:nvPr>
-        </p:nvSpPr>
-        <p:spPr/>
-        <p:txBody>
-          <a:bodyPr/>
-          <a:lstStyle/>
-          <a:p>
-            <a:fld id="{05072F42-4DFA-4725-86F9-7594E4AB4EB5}" type="slidenum">
-              <a:rPr lang="en-GB" smtClean="0"/>
-              <a:pPr/>
-              <a:t>23</a:t>
-            </a:fld>
-            <a:endParaRPr lang="en-GB"/>
-          </a:p>
-        </p:txBody>
-      </p:sp>
-    </p:spTree>
-    <p:extLst>
-      <p:ext uri="{BB962C8B-B14F-4D97-AF65-F5344CB8AC3E}">
-        <p14:creationId xmlns:p14="http://schemas.microsoft.com/office/powerpoint/2010/main" val="1740548191"/>
-      </p:ext>
-    </p:extLst>
-  </p:cSld>
-  <p:clrMapOvr>
-    <a:masterClrMapping/>
-  </p:clrMapOvr>
-</p:sld>
-</file>
-
 <file path=ppt/slides/slide24.xml><?xml version="1.0" encoding="utf-8"?>
 <p:sld xmlns:a="http://schemas.openxmlformats.org/drawingml/2006/main" xmlns:r="http://schemas.openxmlformats.org/officeDocument/2006/relationships" xmlns:p="http://schemas.openxmlformats.org/presentationml/2006/main">
   <p:cSld>
@@ -18580,7 +18956,7 @@
       </p:grpSpPr>
       <p:sp>
         <p:nvSpPr>
-          <p:cNvPr id="2" name="Title 1"/>
+          <p:cNvPr id="5" name="Title 4"/>
           <p:cNvSpPr>
             <a:spLocks noGrp="1"/>
           </p:cNvSpPr>
@@ -18595,21 +18971,14 @@
           <a:p>
             <a:r>
               <a:rPr lang="en-US" dirty="0"/>
-              <a:t>Other Common </a:t>
-            </a:r>
-            <a:br>
-              <a:rPr lang="en-US" dirty="0"/>
-            </a:br>
-            <a:r>
-              <a:rPr lang="en-US" dirty="0"/>
-              <a:t>Path-based algorithms</a:t>
-            </a:r>
-          </a:p>
-        </p:txBody>
-      </p:sp>
-      <p:sp>
-        <p:nvSpPr>
-          <p:cNvPr id="3" name="Content Placeholder 2"/>
+              <a:t>A Sketch of a Solution</a:t>
+            </a:r>
+          </a:p>
+        </p:txBody>
+      </p:sp>
+      <p:sp>
+        <p:nvSpPr>
+          <p:cNvPr id="6" name="Content Placeholder 5"/>
           <p:cNvSpPr>
             <a:spLocks noGrp="1"/>
           </p:cNvSpPr>
@@ -18619,137 +18988,99 @@
         </p:nvSpPr>
         <p:spPr>
           <a:xfrm>
-            <a:off x="575733" y="1485900"/>
-            <a:ext cx="8157007" cy="3814763"/>
-          </a:xfrm>
-        </p:spPr>
-        <p:txBody>
-          <a:bodyPr>
-            <a:noAutofit/>
-          </a:bodyPr>
+            <a:off x="986993" y="1249493"/>
+            <a:ext cx="7226732" cy="3764592"/>
+          </a:xfrm>
+        </p:spPr>
+        <p:txBody>
+          <a:bodyPr/>
           <a:lstStyle/>
           <a:p>
-            <a:pPr marL="0" indent="0">
-              <a:buNone/>
-            </a:pPr>
-            <a:r>
-              <a:rPr lang="en-US" sz="1800" dirty="0"/>
-              <a:t>Sometimes our goal is to compute information about the paths (sets of paths) between nodes</a:t>
-            </a:r>
-          </a:p>
-          <a:p>
-            <a:pPr marL="285750" lvl="1" indent="0">
-              <a:buNone/>
-            </a:pPr>
-            <a:r>
-              <a:rPr lang="en-US" sz="1600" dirty="0"/>
-              <a:t>	Edges may be annotated with </a:t>
-            </a:r>
-            <a:r>
-              <a:rPr lang="en-US" sz="1600" dirty="0">
-                <a:solidFill>
-                  <a:srgbClr val="7B2017"/>
-                </a:solidFill>
-              </a:rPr>
-              <a:t>cost</a:t>
-            </a:r>
-            <a:r>
-              <a:rPr lang="en-US" sz="1600" dirty="0"/>
-              <a:t>, </a:t>
-            </a:r>
-            <a:r>
-              <a:rPr lang="en-US" sz="1600" dirty="0">
-                <a:solidFill>
-                  <a:srgbClr val="7B2017"/>
-                </a:solidFill>
-              </a:rPr>
-              <a:t>distance</a:t>
-            </a:r>
-            <a:r>
-              <a:rPr lang="en-US" sz="1600" dirty="0"/>
-              <a:t>, or </a:t>
-            </a:r>
-            <a:r>
-              <a:rPr lang="en-US" sz="1600" dirty="0">
-                <a:solidFill>
-                  <a:srgbClr val="7B2017"/>
-                </a:solidFill>
-              </a:rPr>
-              <a:t>similarity</a:t>
-            </a:r>
-          </a:p>
-          <a:p>
-            <a:pPr marL="0" indent="0">
-              <a:buNone/>
-            </a:pPr>
-            <a:endParaRPr lang="en-US" sz="1800" dirty="0"/>
-          </a:p>
-          <a:p>
-            <a:pPr marL="0" indent="0">
-              <a:buNone/>
-            </a:pPr>
-            <a:r>
-              <a:rPr lang="en-US" sz="1800" dirty="0"/>
-              <a:t>Examples of such problems (see algorithms courses):</a:t>
-            </a:r>
-          </a:p>
-          <a:p>
-            <a:pPr lvl="1"/>
-            <a:r>
-              <a:rPr lang="en-US" sz="1600" dirty="0">
-                <a:solidFill>
-                  <a:srgbClr val="7B2017"/>
-                </a:solidFill>
-              </a:rPr>
-              <a:t>Shortest path</a:t>
-            </a:r>
-            <a:r>
-              <a:rPr lang="en-US" sz="1600" dirty="0">
-                <a:solidFill>
-                  <a:srgbClr val="FF9900"/>
-                </a:solidFill>
-              </a:rPr>
+            <a:r>
+              <a:rPr lang="en-US" dirty="0"/>
+              <a:t>Run BFS from “us” to find </a:t>
+            </a:r>
+            <a:r>
+              <a:rPr lang="en-US" b="1" dirty="0"/>
+              <a:t>friends</a:t>
+            </a:r>
+            <a:r>
+              <a:rPr lang="en-US" dirty="0"/>
+              <a:t> (nodes at depth 1) and </a:t>
+            </a:r>
+            <a:r>
+              <a:rPr lang="en-US" b="1" dirty="0"/>
+              <a:t>friends of our friends </a:t>
+            </a:r>
+            <a:r>
+              <a:rPr lang="en-US" dirty="0"/>
+              <a:t>(nodes with min depth 2)</a:t>
+            </a:r>
+            <a:endParaRPr lang="en-US" b="1" dirty="0"/>
+          </a:p>
+          <a:p>
+            <a:endParaRPr lang="en-US" dirty="0"/>
+          </a:p>
+          <a:p>
+            <a:r>
+              <a:rPr lang="en-US" dirty="0"/>
+              <a:t>Run BFS from </a:t>
+            </a:r>
+            <a:r>
+              <a:rPr lang="en-US" dirty="0" err="1"/>
+              <a:t>FoF</a:t>
+            </a:r>
+            <a:r>
+              <a:rPr lang="en-US" dirty="0"/>
+              <a:t> to depth 1</a:t>
+            </a:r>
+          </a:p>
+          <a:p>
+            <a:endParaRPr lang="en-US" dirty="0"/>
+          </a:p>
+          <a:p>
+            <a:r>
+              <a:rPr lang="en-US" dirty="0"/>
+              <a:t>For each </a:t>
+            </a:r>
+            <a:r>
+              <a:rPr lang="en-US" dirty="0" err="1"/>
+              <a:t>FoF</a:t>
+            </a:r>
+            <a:r>
+              <a:rPr lang="en-US" dirty="0"/>
+              <a:t> n, count how many </a:t>
+            </a:r>
+            <a:r>
+              <a:rPr lang="en-US" b="1" dirty="0"/>
+              <a:t>of our friends are in common</a:t>
+            </a:r>
+            <a:endParaRPr lang="en-US" dirty="0"/>
+          </a:p>
+          <a:p>
+            <a:endParaRPr lang="en-US" dirty="0"/>
+          </a:p>
+          <a:p>
+            <a:r>
+              <a:rPr lang="en-US" dirty="0"/>
+              <a:t>Rank each </a:t>
+            </a:r>
+            <a:r>
+              <a:rPr lang="en-US" dirty="0" err="1"/>
+              <a:t>FoF</a:t>
+            </a:r>
+            <a:r>
+              <a:rPr lang="en-US" dirty="0"/>
               <a:t> </a:t>
             </a:r>
             <a:r>
-              <a:rPr lang="en-US" sz="1600" dirty="0"/>
-              <a:t>from one node to another (we saw)</a:t>
-            </a:r>
-          </a:p>
-          <a:p>
-            <a:pPr lvl="1"/>
-            <a:r>
-              <a:rPr lang="en-US" sz="1600" dirty="0"/>
-              <a:t>Minimum spanning tree (minimal-cost tree connecting all vertices in a graph)</a:t>
-            </a:r>
-          </a:p>
-          <a:p>
-            <a:pPr lvl="1"/>
-            <a:r>
-              <a:rPr lang="en-US" sz="1600" dirty="0"/>
-              <a:t>Steiner tree (minimal-cost tree connecting certain nodes)</a:t>
-            </a:r>
-          </a:p>
-          <a:p>
-            <a:pPr lvl="1"/>
-            <a:r>
-              <a:rPr lang="en-US" sz="1600" dirty="0"/>
-              <a:t>Topological sort (node in a graph without cycles comes before all nodes it points to)</a:t>
-            </a:r>
-          </a:p>
-          <a:p>
-            <a:pPr marL="0" indent="0">
-              <a:buNone/>
-            </a:pPr>
-            <a:r>
-              <a:rPr lang="en-US" sz="1850" dirty="0"/>
-              <a:t>Other times we want to visit all nodes, all edges, </a:t>
-            </a:r>
-            <a:r>
-              <a:rPr lang="is-IS" sz="1850" dirty="0"/>
-              <a:t>…</a:t>
-            </a:r>
-            <a:endParaRPr lang="en-US" sz="1850" dirty="0"/>
+              <a:rPr lang="en-US" i="1" dirty="0"/>
+              <a:t>n</a:t>
+            </a:r>
+            <a:r>
+              <a:rPr lang="en-US" dirty="0"/>
+              <a:t> by how many friends we have in common</a:t>
+            </a:r>
           </a:p>
         </p:txBody>
       </p:sp>
@@ -18760,40 +19091,27 @@
             <a:spLocks noGrp="1"/>
           </p:cNvSpPr>
           <p:nvPr>
-            <p:ph type="sldNum" sz="quarter" idx="4294967295"/>
+            <p:ph type="sldNum" sz="quarter" idx="12"/>
           </p:nvPr>
         </p:nvSpPr>
-        <p:spPr>
-          <a:xfrm>
-            <a:off x="6191250" y="4957763"/>
-            <a:ext cx="1428750" cy="342900"/>
-          </a:xfrm>
-          <a:prstGeom prst="rect">
-            <a:avLst/>
-          </a:prstGeom>
-        </p:spPr>
+        <p:spPr/>
         <p:txBody>
           <a:bodyPr/>
           <a:lstStyle/>
           <a:p>
-            <a:pPr>
-              <a:defRPr/>
-            </a:pPr>
-            <a:fld id="{E0A909AB-E8DF-44BB-8A56-A213DD3335F7}" type="slidenum">
-              <a:rPr lang="en-US" smtClean="0"/>
-              <a:pPr>
-                <a:defRPr/>
-              </a:pPr>
+            <a:fld id="{05072F42-4DFA-4725-86F9-7594E4AB4EB5}" type="slidenum">
+              <a:rPr lang="en-GB" smtClean="0"/>
+              <a:pPr/>
               <a:t>24</a:t>
             </a:fld>
-            <a:endParaRPr lang="en-US"/>
+            <a:endParaRPr lang="en-GB"/>
           </a:p>
         </p:txBody>
       </p:sp>
     </p:spTree>
     <p:extLst>
       <p:ext uri="{BB962C8B-B14F-4D97-AF65-F5344CB8AC3E}">
-        <p14:creationId xmlns:p14="http://schemas.microsoft.com/office/powerpoint/2010/main" val="1019301596"/>
+        <p14:creationId xmlns:p14="http://schemas.microsoft.com/office/powerpoint/2010/main" val="1740548191"/>
       </p:ext>
     </p:extLst>
   </p:cSld>
@@ -18822,6 +19140,248 @@
       </p:grpSpPr>
       <p:sp>
         <p:nvSpPr>
+          <p:cNvPr id="2" name="Title 1"/>
+          <p:cNvSpPr>
+            <a:spLocks noGrp="1"/>
+          </p:cNvSpPr>
+          <p:nvPr>
+            <p:ph type="title"/>
+          </p:nvPr>
+        </p:nvSpPr>
+        <p:spPr/>
+        <p:txBody>
+          <a:bodyPr/>
+          <a:lstStyle/>
+          <a:p>
+            <a:r>
+              <a:rPr lang="en-US" dirty="0"/>
+              <a:t>Other Common </a:t>
+            </a:r>
+            <a:br>
+              <a:rPr lang="en-US" dirty="0"/>
+            </a:br>
+            <a:r>
+              <a:rPr lang="en-US" dirty="0"/>
+              <a:t>Path-based algorithms</a:t>
+            </a:r>
+          </a:p>
+        </p:txBody>
+      </p:sp>
+      <p:sp>
+        <p:nvSpPr>
+          <p:cNvPr id="3" name="Content Placeholder 2"/>
+          <p:cNvSpPr>
+            <a:spLocks noGrp="1"/>
+          </p:cNvSpPr>
+          <p:nvPr>
+            <p:ph idx="1"/>
+          </p:nvPr>
+        </p:nvSpPr>
+        <p:spPr>
+          <a:xfrm>
+            <a:off x="575733" y="1485900"/>
+            <a:ext cx="8157007" cy="3814763"/>
+          </a:xfrm>
+        </p:spPr>
+        <p:txBody>
+          <a:bodyPr>
+            <a:noAutofit/>
+          </a:bodyPr>
+          <a:lstStyle/>
+          <a:p>
+            <a:pPr marL="0" indent="0">
+              <a:buNone/>
+            </a:pPr>
+            <a:r>
+              <a:rPr lang="en-US" sz="1800" dirty="0"/>
+              <a:t>Sometimes our goal is to compute information about the paths (sets of paths) between nodes</a:t>
+            </a:r>
+          </a:p>
+          <a:p>
+            <a:pPr marL="285750" lvl="1" indent="0">
+              <a:buNone/>
+            </a:pPr>
+            <a:r>
+              <a:rPr lang="en-US" sz="1600" dirty="0"/>
+              <a:t>	Edges may be annotated with </a:t>
+            </a:r>
+            <a:r>
+              <a:rPr lang="en-US" sz="1600" dirty="0">
+                <a:solidFill>
+                  <a:srgbClr val="7B2017"/>
+                </a:solidFill>
+              </a:rPr>
+              <a:t>cost</a:t>
+            </a:r>
+            <a:r>
+              <a:rPr lang="en-US" sz="1600" dirty="0"/>
+              <a:t>, </a:t>
+            </a:r>
+            <a:r>
+              <a:rPr lang="en-US" sz="1600" dirty="0">
+                <a:solidFill>
+                  <a:srgbClr val="7B2017"/>
+                </a:solidFill>
+              </a:rPr>
+              <a:t>distance</a:t>
+            </a:r>
+            <a:r>
+              <a:rPr lang="en-US" sz="1600" dirty="0"/>
+              <a:t>, or </a:t>
+            </a:r>
+            <a:r>
+              <a:rPr lang="en-US" sz="1600" dirty="0">
+                <a:solidFill>
+                  <a:srgbClr val="7B2017"/>
+                </a:solidFill>
+              </a:rPr>
+              <a:t>similarity</a:t>
+            </a:r>
+          </a:p>
+          <a:p>
+            <a:pPr marL="0" indent="0">
+              <a:buNone/>
+            </a:pPr>
+            <a:endParaRPr lang="en-US" sz="1800" dirty="0"/>
+          </a:p>
+          <a:p>
+            <a:pPr marL="0" indent="0">
+              <a:buNone/>
+            </a:pPr>
+            <a:r>
+              <a:rPr lang="en-US" sz="1800" dirty="0"/>
+              <a:t>Examples of such problems (see algorithms courses):</a:t>
+            </a:r>
+          </a:p>
+          <a:p>
+            <a:pPr lvl="1"/>
+            <a:r>
+              <a:rPr lang="en-US" sz="1600" dirty="0">
+                <a:solidFill>
+                  <a:srgbClr val="7B2017"/>
+                </a:solidFill>
+              </a:rPr>
+              <a:t>Shortest path</a:t>
+            </a:r>
+            <a:r>
+              <a:rPr lang="en-US" sz="1600" dirty="0">
+                <a:solidFill>
+                  <a:srgbClr val="FF9900"/>
+                </a:solidFill>
+              </a:rPr>
+              <a:t> </a:t>
+            </a:r>
+            <a:r>
+              <a:rPr lang="en-US" sz="1600" dirty="0"/>
+              <a:t>from one node to another (we saw)</a:t>
+            </a:r>
+          </a:p>
+          <a:p>
+            <a:pPr lvl="1"/>
+            <a:r>
+              <a:rPr lang="en-US" sz="1600" dirty="0"/>
+              <a:t>Minimum spanning tree (minimal-cost tree connecting all vertices in a graph)</a:t>
+            </a:r>
+          </a:p>
+          <a:p>
+            <a:pPr lvl="1"/>
+            <a:r>
+              <a:rPr lang="en-US" sz="1600" dirty="0"/>
+              <a:t>Steiner tree (minimal-cost tree connecting certain nodes)</a:t>
+            </a:r>
+          </a:p>
+          <a:p>
+            <a:pPr lvl="1"/>
+            <a:r>
+              <a:rPr lang="en-US" sz="1600" dirty="0"/>
+              <a:t>Topological sort (node in a graph without cycles comes before all nodes it points to)</a:t>
+            </a:r>
+          </a:p>
+          <a:p>
+            <a:pPr marL="0" indent="0">
+              <a:buNone/>
+            </a:pPr>
+            <a:r>
+              <a:rPr lang="en-US" sz="1850" dirty="0"/>
+              <a:t>Other times we want to visit all nodes, all edges, </a:t>
+            </a:r>
+            <a:r>
+              <a:rPr lang="is-IS" sz="1850" dirty="0"/>
+              <a:t>…</a:t>
+            </a:r>
+            <a:endParaRPr lang="en-US" sz="1850" dirty="0"/>
+          </a:p>
+        </p:txBody>
+      </p:sp>
+      <p:sp>
+        <p:nvSpPr>
+          <p:cNvPr id="4" name="Slide Number Placeholder 3"/>
+          <p:cNvSpPr>
+            <a:spLocks noGrp="1"/>
+          </p:cNvSpPr>
+          <p:nvPr>
+            <p:ph type="sldNum" sz="quarter" idx="4294967295"/>
+          </p:nvPr>
+        </p:nvSpPr>
+        <p:spPr>
+          <a:xfrm>
+            <a:off x="6191250" y="4957763"/>
+            <a:ext cx="1428750" cy="342900"/>
+          </a:xfrm>
+          <a:prstGeom prst="rect">
+            <a:avLst/>
+          </a:prstGeom>
+        </p:spPr>
+        <p:txBody>
+          <a:bodyPr/>
+          <a:lstStyle/>
+          <a:p>
+            <a:pPr>
+              <a:defRPr/>
+            </a:pPr>
+            <a:fld id="{E0A909AB-E8DF-44BB-8A56-A213DD3335F7}" type="slidenum">
+              <a:rPr lang="en-US" smtClean="0"/>
+              <a:pPr>
+                <a:defRPr/>
+              </a:pPr>
+              <a:t>25</a:t>
+            </a:fld>
+            <a:endParaRPr lang="en-US"/>
+          </a:p>
+        </p:txBody>
+      </p:sp>
+    </p:spTree>
+    <p:extLst>
+      <p:ext uri="{BB962C8B-B14F-4D97-AF65-F5344CB8AC3E}">
+        <p14:creationId xmlns:p14="http://schemas.microsoft.com/office/powerpoint/2010/main" val="1019301596"/>
+      </p:ext>
+    </p:extLst>
+  </p:cSld>
+  <p:clrMapOvr>
+    <a:masterClrMapping/>
+  </p:clrMapOvr>
+</p:sld>
+</file>
+
+<file path=ppt/slides/slide26.xml><?xml version="1.0" encoding="utf-8"?>
+<p:sld xmlns:a="http://schemas.openxmlformats.org/drawingml/2006/main" xmlns:r="http://schemas.openxmlformats.org/officeDocument/2006/relationships" xmlns:p="http://schemas.openxmlformats.org/presentationml/2006/main">
+  <p:cSld>
+    <p:spTree>
+      <p:nvGrpSpPr>
+        <p:cNvPr id="1" name=""/>
+        <p:cNvGrpSpPr/>
+        <p:nvPr/>
+      </p:nvGrpSpPr>
+      <p:grpSpPr>
+        <a:xfrm>
+          <a:off x="0" y="0"/>
+          <a:ext cx="0" cy="0"/>
+          <a:chOff x="0" y="0"/>
+          <a:chExt cx="0" cy="0"/>
+        </a:xfrm>
+      </p:grpSpPr>
+      <p:sp>
+        <p:nvSpPr>
           <p:cNvPr id="2" name="Title 1">
             <a:extLst>
               <a:ext uri="{FF2B5EF4-FFF2-40B4-BE49-F238E27FC236}">
@@ -18928,7 +19488,7 @@
               <a:pPr>
                 <a:defRPr/>
               </a:pPr>
-              <a:t>25</a:t>
+              <a:t>26</a:t>
             </a:fld>
             <a:endParaRPr lang="en-GB"/>
           </a:p>
@@ -23417,7 +23977,7 @@
         <p:spPr>
           <a:xfrm>
             <a:off x="4429667" y="1119257"/>
-            <a:ext cx="1393651" cy="1631216"/>
+            <a:ext cx="1831720" cy="1323439"/>
           </a:xfrm>
           <a:prstGeom prst="rect">
             <a:avLst/>
@@ -23432,42 +23992,35 @@
           <a:p>
             <a:r>
               <a:rPr lang="en-US" i="1" dirty="0"/>
-              <a:t>We’ll focus</a:t>
+              <a:t>This </a:t>
+            </a:r>
+            <a:r>
+              <a:rPr lang="en-US" b="1" i="1" dirty="0"/>
+              <a:t>edge</a:t>
+            </a:r>
+            <a:endParaRPr lang="en-US" i="1" dirty="0"/>
+          </a:p>
+          <a:p>
+            <a:r>
+              <a:rPr lang="en-US" i="1" dirty="0"/>
+              <a:t>relation can</a:t>
+            </a:r>
+          </a:p>
+          <a:p>
+            <a:r>
+              <a:rPr lang="en-US" i="1" dirty="0"/>
+              <a:t>be encoded</a:t>
             </a:r>
             <a:br>
               <a:rPr lang="en-US" i="1" dirty="0"/>
             </a:br>
             <a:r>
               <a:rPr lang="en-US" i="1" dirty="0"/>
-              <a:t>on graphs</a:t>
-            </a:r>
-            <a:br>
-              <a:rPr lang="en-US" i="1" dirty="0"/>
-            </a:br>
-            <a:r>
-              <a:rPr lang="en-US" i="1" dirty="0"/>
-              <a:t>initially as</a:t>
-            </a:r>
-          </a:p>
-          <a:p>
-            <a:r>
-              <a:rPr lang="en-US" i="1" dirty="0"/>
-              <a:t>an </a:t>
-            </a:r>
-            <a:r>
-              <a:rPr lang="en-US" b="1" i="1" dirty="0"/>
-              <a:t>edge</a:t>
-            </a:r>
-            <a:r>
-              <a:rPr lang="en-US" i="1" dirty="0"/>
-              <a:t> </a:t>
-            </a:r>
-            <a:br>
-              <a:rPr lang="en-US" i="1" dirty="0"/>
-            </a:br>
+              <a:t>in a </a:t>
+            </a:r>
             <a:r>
               <a:rPr lang="en-US" i="1" dirty="0" err="1"/>
-              <a:t>Dataframe</a:t>
+              <a:t>dataframe</a:t>
             </a:r>
             <a:endParaRPr lang="en-US" i="1" dirty="0"/>
           </a:p>
@@ -25138,7 +25691,7 @@
         <p:spPr>
           <a:xfrm>
             <a:off x="6736156" y="4550732"/>
-            <a:ext cx="2276585" cy="1015663"/>
+            <a:ext cx="1975221" cy="1015663"/>
           </a:xfrm>
           <a:prstGeom prst="rect">
             <a:avLst/>
@@ -25153,7 +25706,7 @@
           <a:p>
             <a:r>
               <a:rPr lang="en-US" i="1" dirty="0"/>
-              <a:t>This matrix can be</a:t>
+              <a:t>This can be</a:t>
             </a:r>
           </a:p>
           <a:p>
@@ -25266,7 +25819,13 @@
       </p:grpSpPr>
       <p:sp>
         <p:nvSpPr>
-          <p:cNvPr id="6" name="Title 5"/>
+          <p:cNvPr id="5" name="Title 4">
+            <a:extLst>
+              <a:ext uri="{FF2B5EF4-FFF2-40B4-BE49-F238E27FC236}">
+                <a16:creationId xmlns:a16="http://schemas.microsoft.com/office/drawing/2014/main" id="{2B069404-9B18-4C26-9A43-E9B502D5054D}"/>
+              </a:ext>
+            </a:extLst>
+          </p:cNvPr>
           <p:cNvSpPr>
             <a:spLocks noGrp="1"/>
           </p:cNvSpPr>
@@ -25281,46 +25840,110 @@
           <a:p>
             <a:r>
               <a:rPr lang="en-US" dirty="0"/>
-              <a:t>A Brief Intro to Graph Analysis,</a:t>
-            </a:r>
-            <a:br>
-              <a:rPr lang="en-US" dirty="0"/>
-            </a:br>
-            <a:r>
-              <a:rPr lang="en-US" dirty="0"/>
-              <a:t>aka Network Science</a:t>
-            </a:r>
-          </a:p>
-        </p:txBody>
-      </p:sp>
-      <p:sp>
-        <p:nvSpPr>
-          <p:cNvPr id="8" name="Rectangle 3"/>
+              <a:t>Summary</a:t>
+            </a:r>
+          </a:p>
+        </p:txBody>
+      </p:sp>
+      <p:sp>
+        <p:nvSpPr>
+          <p:cNvPr id="6" name="Content Placeholder 5">
+            <a:extLst>
+              <a:ext uri="{FF2B5EF4-FFF2-40B4-BE49-F238E27FC236}">
+                <a16:creationId xmlns:a16="http://schemas.microsoft.com/office/drawing/2014/main" id="{BB4E3060-B964-46D5-9544-AF7A87357FF4}"/>
+              </a:ext>
+            </a:extLst>
+          </p:cNvPr>
           <p:cNvSpPr>
-            <a:spLocks noGrp="1" noChangeArrowheads="1"/>
+            <a:spLocks noGrp="1"/>
           </p:cNvSpPr>
           <p:nvPr>
-            <p:ph type="body" idx="1"/>
+            <p:ph idx="1"/>
           </p:nvPr>
         </p:nvSpPr>
         <p:spPr/>
         <p:txBody>
-          <a:bodyPr>
-            <a:normAutofit/>
-          </a:bodyPr>
+          <a:bodyPr/>
           <a:lstStyle/>
           <a:p>
-            <a:endParaRPr lang="en-US" altLang="en-US" dirty="0">
-              <a:solidFill>
-                <a:srgbClr val="800000"/>
-              </a:solidFill>
-            </a:endParaRPr>
-          </a:p>
-        </p:txBody>
-      </p:sp>
-      <p:sp>
-        <p:nvSpPr>
-          <p:cNvPr id="5" name="Slide Number Placeholder 4"/>
+            <a:r>
+              <a:rPr lang="en-US" dirty="0"/>
+              <a:t>Graphs are useful in a number of contexts, describing connectivity among individuals or entities</a:t>
+            </a:r>
+          </a:p>
+          <a:p>
+            <a:endParaRPr lang="en-US" dirty="0"/>
+          </a:p>
+          <a:p>
+            <a:r>
+              <a:rPr lang="en-US" dirty="0"/>
+              <a:t>They may be directed or undirected, and there is a set </a:t>
+            </a:r>
+            <a:r>
+              <a:rPr lang="en-US" dirty="0" err="1"/>
+              <a:t>tof</a:t>
+            </a:r>
+            <a:r>
+              <a:rPr lang="en-US" dirty="0"/>
+              <a:t> basic terminology</a:t>
+            </a:r>
+          </a:p>
+          <a:p>
+            <a:endParaRPr lang="en-US" dirty="0"/>
+          </a:p>
+          <a:p>
+            <a:r>
+              <a:rPr lang="en-US" dirty="0"/>
+              <a:t>They may be encoded using adjacency lists, equivalent relations (</a:t>
+            </a:r>
+            <a:r>
+              <a:rPr lang="en-US" dirty="0" err="1"/>
+              <a:t>dataframes</a:t>
+            </a:r>
+            <a:r>
+              <a:rPr lang="en-US" dirty="0"/>
+              <a:t>), and adjacency matrices</a:t>
+            </a:r>
+          </a:p>
+        </p:txBody>
+      </p:sp>
+      <p:sp>
+        <p:nvSpPr>
+          <p:cNvPr id="3" name="Footer Placeholder 2">
+            <a:extLst>
+              <a:ext uri="{FF2B5EF4-FFF2-40B4-BE49-F238E27FC236}">
+                <a16:creationId xmlns:a16="http://schemas.microsoft.com/office/drawing/2014/main" id="{D9DA495A-963C-4BAC-B0BA-19CD7C9709D7}"/>
+              </a:ext>
+            </a:extLst>
+          </p:cNvPr>
+          <p:cNvSpPr>
+            <a:spLocks noGrp="1"/>
+          </p:cNvSpPr>
+          <p:nvPr>
+            <p:ph type="ftr" sz="quarter" idx="11"/>
+          </p:nvPr>
+        </p:nvSpPr>
+        <p:spPr/>
+        <p:txBody>
+          <a:bodyPr/>
+          <a:lstStyle/>
+          <a:p>
+            <a:pPr>
+              <a:defRPr/>
+            </a:pPr>
+            <a:endParaRPr lang="en-GB" dirty="0"/>
+          </a:p>
+        </p:txBody>
+      </p:sp>
+      <p:sp>
+        <p:nvSpPr>
+          <p:cNvPr id="4" name="Slide Number Placeholder 3">
+            <a:extLst>
+              <a:ext uri="{FF2B5EF4-FFF2-40B4-BE49-F238E27FC236}">
+                <a16:creationId xmlns:a16="http://schemas.microsoft.com/office/drawing/2014/main" id="{34CACDF5-04AA-4848-B914-C28AC39A5309}"/>
+              </a:ext>
+            </a:extLst>
+          </p:cNvPr>
           <p:cNvSpPr>
             <a:spLocks noGrp="1"/>
           </p:cNvSpPr>
@@ -25333,9 +25956,14 @@
           <a:bodyPr/>
           <a:lstStyle/>
           <a:p>
-            <a:fld id="{05072F42-4DFA-4725-86F9-7594E4AB4EB5}" type="slidenum">
+            <a:pPr>
+              <a:defRPr/>
+            </a:pPr>
+            <a:fld id="{7511EA30-EE1A-224C-B1A5-D613D649D340}" type="slidenum">
               <a:rPr lang="en-GB" smtClean="0"/>
-              <a:pPr/>
+              <a:pPr>
+                <a:defRPr/>
+              </a:pPr>
               <a:t>9</a:t>
             </a:fld>
             <a:endParaRPr lang="en-GB"/>
@@ -25345,7 +25973,7 @@
     </p:spTree>
     <p:extLst>
       <p:ext uri="{BB962C8B-B14F-4D97-AF65-F5344CB8AC3E}">
-        <p14:creationId xmlns:p14="http://schemas.microsoft.com/office/powerpoint/2010/main" val="1265313350"/>
+        <p14:creationId xmlns:p14="http://schemas.microsoft.com/office/powerpoint/2010/main" val="2574382815"/>
       </p:ext>
     </p:extLst>
   </p:cSld>

</xml_diff>